<commit_message>
Added new Fig 4, the caption needs to be changed, but just for Dr. Becker to see if it is what he wants.
</commit_message>
<xml_diff>
--- a/journalWallFriction/pictures/pdf/differentNumSides.pptx
+++ b/journalWallFriction/pictures/pdf/differentNumSides.pptx
@@ -243,7 +243,7 @@
           <a:p>
             <a:fld id="{BD5E1F6D-FFA6-BC44-B9B8-BBE6A1110E96}" type="datetimeFigureOut">
               <a:rPr lang="en-US" smtClean="0"/>
-              <a:t>5/30/18</a:t>
+              <a:t>12/6/18</a:t>
             </a:fld>
             <a:endParaRPr lang="en-US"/>
           </a:p>
@@ -413,7 +413,7 @@
           <a:p>
             <a:fld id="{BD5E1F6D-FFA6-BC44-B9B8-BBE6A1110E96}" type="datetimeFigureOut">
               <a:rPr lang="en-US" smtClean="0"/>
-              <a:t>5/30/18</a:t>
+              <a:t>12/6/18</a:t>
             </a:fld>
             <a:endParaRPr lang="en-US"/>
           </a:p>
@@ -593,7 +593,7 @@
           <a:p>
             <a:fld id="{BD5E1F6D-FFA6-BC44-B9B8-BBE6A1110E96}" type="datetimeFigureOut">
               <a:rPr lang="en-US" smtClean="0"/>
-              <a:t>5/30/18</a:t>
+              <a:t>12/6/18</a:t>
             </a:fld>
             <a:endParaRPr lang="en-US"/>
           </a:p>
@@ -763,7 +763,7 @@
           <a:p>
             <a:fld id="{BD5E1F6D-FFA6-BC44-B9B8-BBE6A1110E96}" type="datetimeFigureOut">
               <a:rPr lang="en-US" smtClean="0"/>
-              <a:t>5/30/18</a:t>
+              <a:t>12/6/18</a:t>
             </a:fld>
             <a:endParaRPr lang="en-US"/>
           </a:p>
@@ -1007,7 +1007,7 @@
           <a:p>
             <a:fld id="{BD5E1F6D-FFA6-BC44-B9B8-BBE6A1110E96}" type="datetimeFigureOut">
               <a:rPr lang="en-US" smtClean="0"/>
-              <a:t>5/30/18</a:t>
+              <a:t>12/6/18</a:t>
             </a:fld>
             <a:endParaRPr lang="en-US"/>
           </a:p>
@@ -1239,7 +1239,7 @@
           <a:p>
             <a:fld id="{BD5E1F6D-FFA6-BC44-B9B8-BBE6A1110E96}" type="datetimeFigureOut">
               <a:rPr lang="en-US" smtClean="0"/>
-              <a:t>5/30/18</a:t>
+              <a:t>12/6/18</a:t>
             </a:fld>
             <a:endParaRPr lang="en-US"/>
           </a:p>
@@ -1606,7 +1606,7 @@
           <a:p>
             <a:fld id="{BD5E1F6D-FFA6-BC44-B9B8-BBE6A1110E96}" type="datetimeFigureOut">
               <a:rPr lang="en-US" smtClean="0"/>
-              <a:t>5/30/18</a:t>
+              <a:t>12/6/18</a:t>
             </a:fld>
             <a:endParaRPr lang="en-US"/>
           </a:p>
@@ -1724,7 +1724,7 @@
           <a:p>
             <a:fld id="{BD5E1F6D-FFA6-BC44-B9B8-BBE6A1110E96}" type="datetimeFigureOut">
               <a:rPr lang="en-US" smtClean="0"/>
-              <a:t>5/30/18</a:t>
+              <a:t>12/6/18</a:t>
             </a:fld>
             <a:endParaRPr lang="en-US"/>
           </a:p>
@@ -1819,7 +1819,7 @@
           <a:p>
             <a:fld id="{BD5E1F6D-FFA6-BC44-B9B8-BBE6A1110E96}" type="datetimeFigureOut">
               <a:rPr lang="en-US" smtClean="0"/>
-              <a:t>5/30/18</a:t>
+              <a:t>12/6/18</a:t>
             </a:fld>
             <a:endParaRPr lang="en-US"/>
           </a:p>
@@ -2096,7 +2096,7 @@
           <a:p>
             <a:fld id="{BD5E1F6D-FFA6-BC44-B9B8-BBE6A1110E96}" type="datetimeFigureOut">
               <a:rPr lang="en-US" smtClean="0"/>
-              <a:t>5/30/18</a:t>
+              <a:t>12/6/18</a:t>
             </a:fld>
             <a:endParaRPr lang="en-US"/>
           </a:p>
@@ -2353,7 +2353,7 @@
           <a:p>
             <a:fld id="{BD5E1F6D-FFA6-BC44-B9B8-BBE6A1110E96}" type="datetimeFigureOut">
               <a:rPr lang="en-US" smtClean="0"/>
-              <a:t>5/30/18</a:t>
+              <a:t>12/6/18</a:t>
             </a:fld>
             <a:endParaRPr lang="en-US"/>
           </a:p>
@@ -2566,7 +2566,7 @@
           <a:p>
             <a:fld id="{BD5E1F6D-FFA6-BC44-B9B8-BBE6A1110E96}" type="datetimeFigureOut">
               <a:rPr lang="en-US" smtClean="0"/>
-              <a:t>5/30/18</a:t>
+              <a:t>12/6/18</a:t>
             </a:fld>
             <a:endParaRPr lang="en-US"/>
           </a:p>
@@ -2971,246 +2971,6 @@
           <a:chExt cx="0" cy="0"/>
         </a:xfrm>
       </p:grpSpPr>
-      <p:pic>
-        <p:nvPicPr>
-          <p:cNvPr id="64" name="Picture 63">
-            <a:extLst>
-              <a:ext uri="{FF2B5EF4-FFF2-40B4-BE49-F238E27FC236}">
-                <a16:creationId xmlns:a16="http://schemas.microsoft.com/office/drawing/2014/main" id="{1972724E-567D-D043-A86D-C3DC8DBACBBB}"/>
-              </a:ext>
-            </a:extLst>
-          </p:cNvPr>
-          <p:cNvPicPr>
-            <a:picLocks noChangeAspect="1"/>
-          </p:cNvPicPr>
-          <p:nvPr/>
-        </p:nvPicPr>
-        <p:blipFill>
-          <a:blip r:embed="rId2"/>
-          <a:stretch>
-            <a:fillRect/>
-          </a:stretch>
-        </p:blipFill>
-        <p:spPr>
-          <a:xfrm>
-            <a:off x="834796" y="6962801"/>
-            <a:ext cx="1070036" cy="948015"/>
-          </a:xfrm>
-          <a:prstGeom prst="rect">
-            <a:avLst/>
-          </a:prstGeom>
-        </p:spPr>
-      </p:pic>
-      <p:pic>
-        <p:nvPicPr>
-          <p:cNvPr id="65" name="Picture 64">
-            <a:extLst>
-              <a:ext uri="{FF2B5EF4-FFF2-40B4-BE49-F238E27FC236}">
-                <a16:creationId xmlns:a16="http://schemas.microsoft.com/office/drawing/2014/main" id="{0B2F449E-6C4D-9D4D-A872-52FFD7815D9E}"/>
-              </a:ext>
-            </a:extLst>
-          </p:cNvPr>
-          <p:cNvPicPr>
-            <a:picLocks noChangeAspect="1"/>
-          </p:cNvPicPr>
-          <p:nvPr/>
-        </p:nvPicPr>
-        <p:blipFill>
-          <a:blip r:embed="rId3"/>
-          <a:stretch>
-            <a:fillRect/>
-          </a:stretch>
-        </p:blipFill>
-        <p:spPr>
-          <a:xfrm>
-            <a:off x="2454131" y="6469816"/>
-            <a:ext cx="2098086" cy="1830545"/>
-          </a:xfrm>
-          <a:prstGeom prst="rect">
-            <a:avLst/>
-          </a:prstGeom>
-        </p:spPr>
-      </p:pic>
-      <p:pic>
-        <p:nvPicPr>
-          <p:cNvPr id="66" name="Picture 65">
-            <a:extLst>
-              <a:ext uri="{FF2B5EF4-FFF2-40B4-BE49-F238E27FC236}">
-                <a16:creationId xmlns:a16="http://schemas.microsoft.com/office/drawing/2014/main" id="{F6BD96AF-74C7-B047-A8D8-35FBF400FDF1}"/>
-              </a:ext>
-            </a:extLst>
-          </p:cNvPr>
-          <p:cNvPicPr>
-            <a:picLocks noChangeAspect="1"/>
-          </p:cNvPicPr>
-          <p:nvPr/>
-        </p:nvPicPr>
-        <p:blipFill>
-          <a:blip r:embed="rId4"/>
-          <a:stretch>
-            <a:fillRect/>
-          </a:stretch>
-        </p:blipFill>
-        <p:spPr>
-          <a:xfrm>
-            <a:off x="814305" y="4839692"/>
-            <a:ext cx="1042349" cy="1096948"/>
-          </a:xfrm>
-          <a:prstGeom prst="rect">
-            <a:avLst/>
-          </a:prstGeom>
-        </p:spPr>
-      </p:pic>
-      <p:pic>
-        <p:nvPicPr>
-          <p:cNvPr id="67" name="Picture 66">
-            <a:extLst>
-              <a:ext uri="{FF2B5EF4-FFF2-40B4-BE49-F238E27FC236}">
-                <a16:creationId xmlns:a16="http://schemas.microsoft.com/office/drawing/2014/main" id="{99880E57-9C5E-0B43-A5E7-B5567EF26249}"/>
-              </a:ext>
-            </a:extLst>
-          </p:cNvPr>
-          <p:cNvPicPr>
-            <a:picLocks noChangeAspect="1"/>
-          </p:cNvPicPr>
-          <p:nvPr/>
-        </p:nvPicPr>
-        <p:blipFill>
-          <a:blip r:embed="rId5"/>
-          <a:stretch>
-            <a:fillRect/>
-          </a:stretch>
-        </p:blipFill>
-        <p:spPr>
-          <a:xfrm>
-            <a:off x="2559560" y="4379942"/>
-            <a:ext cx="1982199" cy="2089874"/>
-          </a:xfrm>
-          <a:prstGeom prst="rect">
-            <a:avLst/>
-          </a:prstGeom>
-        </p:spPr>
-      </p:pic>
-      <p:pic>
-        <p:nvPicPr>
-          <p:cNvPr id="68" name="Picture 67">
-            <a:extLst>
-              <a:ext uri="{FF2B5EF4-FFF2-40B4-BE49-F238E27FC236}">
-                <a16:creationId xmlns:a16="http://schemas.microsoft.com/office/drawing/2014/main" id="{52E5A4C3-0975-D246-9D18-D5A1608D25C3}"/>
-              </a:ext>
-            </a:extLst>
-          </p:cNvPr>
-          <p:cNvPicPr>
-            <a:picLocks noChangeAspect="1"/>
-          </p:cNvPicPr>
-          <p:nvPr/>
-        </p:nvPicPr>
-        <p:blipFill>
-          <a:blip r:embed="rId6"/>
-          <a:stretch>
-            <a:fillRect/>
-          </a:stretch>
-        </p:blipFill>
-        <p:spPr>
-          <a:xfrm>
-            <a:off x="867772" y="8936977"/>
-            <a:ext cx="1074057" cy="1083438"/>
-          </a:xfrm>
-          <a:prstGeom prst="rect">
-            <a:avLst/>
-          </a:prstGeom>
-        </p:spPr>
-      </p:pic>
-      <p:pic>
-        <p:nvPicPr>
-          <p:cNvPr id="69" name="Picture 68">
-            <a:extLst>
-              <a:ext uri="{FF2B5EF4-FFF2-40B4-BE49-F238E27FC236}">
-                <a16:creationId xmlns:a16="http://schemas.microsoft.com/office/drawing/2014/main" id="{8031818D-4877-9A45-8CC8-F1A5E83A2FF3}"/>
-              </a:ext>
-            </a:extLst>
-          </p:cNvPr>
-          <p:cNvPicPr>
-            <a:picLocks noChangeAspect="1"/>
-          </p:cNvPicPr>
-          <p:nvPr/>
-        </p:nvPicPr>
-        <p:blipFill>
-          <a:blip r:embed="rId7"/>
-          <a:stretch>
-            <a:fillRect/>
-          </a:stretch>
-        </p:blipFill>
-        <p:spPr>
-          <a:xfrm>
-            <a:off x="2440432" y="8496152"/>
-            <a:ext cx="2068506" cy="2059271"/>
-          </a:xfrm>
-          <a:prstGeom prst="rect">
-            <a:avLst/>
-          </a:prstGeom>
-        </p:spPr>
-      </p:pic>
-      <p:pic>
-        <p:nvPicPr>
-          <p:cNvPr id="72" name="Picture 71">
-            <a:extLst>
-              <a:ext uri="{FF2B5EF4-FFF2-40B4-BE49-F238E27FC236}">
-                <a16:creationId xmlns:a16="http://schemas.microsoft.com/office/drawing/2014/main" id="{2967C863-23D3-B74B-AE76-2FCD716F696E}"/>
-              </a:ext>
-            </a:extLst>
-          </p:cNvPr>
-          <p:cNvPicPr>
-            <a:picLocks noChangeAspect="1"/>
-          </p:cNvPicPr>
-          <p:nvPr/>
-        </p:nvPicPr>
-        <p:blipFill>
-          <a:blip r:embed="rId8"/>
-          <a:stretch>
-            <a:fillRect/>
-          </a:stretch>
-        </p:blipFill>
-        <p:spPr>
-          <a:xfrm>
-            <a:off x="914502" y="582519"/>
-            <a:ext cx="942152" cy="1120114"/>
-          </a:xfrm>
-          <a:prstGeom prst="rect">
-            <a:avLst/>
-          </a:prstGeom>
-        </p:spPr>
-      </p:pic>
-      <p:pic>
-        <p:nvPicPr>
-          <p:cNvPr id="73" name="Picture 72">
-            <a:extLst>
-              <a:ext uri="{FF2B5EF4-FFF2-40B4-BE49-F238E27FC236}">
-                <a16:creationId xmlns:a16="http://schemas.microsoft.com/office/drawing/2014/main" id="{CA501888-9E9F-C64F-AC2D-AA4ABA62E4FE}"/>
-              </a:ext>
-            </a:extLst>
-          </p:cNvPr>
-          <p:cNvPicPr>
-            <a:picLocks noChangeAspect="1"/>
-          </p:cNvPicPr>
-          <p:nvPr/>
-        </p:nvPicPr>
-        <p:blipFill>
-          <a:blip r:embed="rId9"/>
-          <a:stretch>
-            <a:fillRect/>
-          </a:stretch>
-        </p:blipFill>
-        <p:spPr>
-          <a:xfrm>
-            <a:off x="2649184" y="0"/>
-            <a:ext cx="1769580" cy="2013482"/>
-          </a:xfrm>
-          <a:prstGeom prst="rect">
-            <a:avLst/>
-          </a:prstGeom>
-        </p:spPr>
-      </p:pic>
       <p:sp>
         <p:nvSpPr>
           <p:cNvPr id="74" name="TextBox 73">
@@ -3366,7 +3126,7 @@
         </p:nvSpPr>
         <p:spPr>
           <a:xfrm>
-            <a:off x="164373" y="7297363"/>
+            <a:off x="164373" y="7408780"/>
             <a:ext cx="683421" cy="331629"/>
           </a:xfrm>
           <a:prstGeom prst="rect">
@@ -3394,13 +3154,13 @@
                 <a:ea typeface="Times" charset="0"/>
                 <a:cs typeface="Times" charset="0"/>
               </a:rPr>
-              <a:t>= 6</a:t>
-            </a:r>
-          </a:p>
-        </p:txBody>
-      </p:sp>
-      <mc:AlternateContent xmlns:mc="http://schemas.openxmlformats.org/markup-compatibility/2006" xmlns:a14="http://schemas.microsoft.com/office/drawing/2010/main">
-        <mc:Choice Requires="a14">
+              <a:t>= 8</a:t>
+            </a:r>
+          </a:p>
+        </p:txBody>
+      </p:sp>
+      <mc:AlternateContent xmlns:mc="http://schemas.openxmlformats.org/markup-compatibility/2006">
+        <mc:Choice xmlns:a14="http://schemas.microsoft.com/office/drawing/2010/main" Requires="a14">
           <p:sp>
             <p:nvSpPr>
               <p:cNvPr id="78" name="TextBox 77">
@@ -3415,7 +3175,7 @@
             </p:nvSpPr>
             <p:spPr>
               <a:xfrm>
-                <a:off x="117206" y="9237876"/>
+                <a:off x="122451" y="9465473"/>
                 <a:ext cx="1020894" cy="570926"/>
               </a:xfrm>
               <a:prstGeom prst="rect">
@@ -3448,12 +3208,20 @@
                 <a14:m>
                   <m:oMath xmlns:m="http://schemas.openxmlformats.org/officeDocument/2006/math">
                     <m:r>
+                      <a:rPr lang="en-US" i="1">
+                        <a:latin typeface="Cambria Math" panose="02040503050406030204" pitchFamily="18" charset="0"/>
+                        <a:ea typeface="Times" charset="0"/>
+                        <a:cs typeface="Times" charset="0"/>
+                      </a:rPr>
+                      <m:t>1</m:t>
+                    </m:r>
+                    <m:r>
                       <a:rPr lang="en-US" b="0" i="1" smtClean="0">
                         <a:latin typeface="Cambria Math" panose="02040503050406030204" pitchFamily="18" charset="0"/>
                         <a:ea typeface="Times" charset="0"/>
                         <a:cs typeface="Times" charset="0"/>
                       </a:rPr>
-                      <m:t>20</m:t>
+                      <m:t>0</m:t>
                     </m:r>
                   </m:oMath>
                 </a14:m>
@@ -3473,7 +3241,7 @@
             </p:txBody>
           </p:sp>
         </mc:Choice>
-        <mc:Fallback xmlns="">
+        <mc:Fallback>
           <p:sp>
             <p:nvSpPr>
               <p:cNvPr id="78" name="TextBox 77">
@@ -3490,16 +3258,16 @@
             </p:nvSpPr>
             <p:spPr>
               <a:xfrm>
-                <a:off x="117206" y="9237876"/>
+                <a:off x="122451" y="9465473"/>
                 <a:ext cx="1020894" cy="570926"/>
               </a:xfrm>
               <a:prstGeom prst="rect">
                 <a:avLst/>
               </a:prstGeom>
               <a:blipFill>
-                <a:blip r:embed="rId14"/>
+                <a:blip r:embed="rId2"/>
                 <a:stretch>
-                  <a:fillRect l="-2439"/>
+                  <a:fillRect l="-2469"/>
                 </a:stretch>
               </a:blipFill>
             </p:spPr>
@@ -3518,8 +3286,8 @@
           </p:sp>
         </mc:Fallback>
       </mc:AlternateContent>
-      <mc:AlternateContent xmlns:mc="http://schemas.openxmlformats.org/markup-compatibility/2006" xmlns:a14="http://schemas.microsoft.com/office/drawing/2010/main">
-        <mc:Choice Requires="a14">
+      <mc:AlternateContent xmlns:mc="http://schemas.openxmlformats.org/markup-compatibility/2006">
+        <mc:Choice xmlns:a14="http://schemas.microsoft.com/office/drawing/2010/main" Requires="a14">
           <p:sp>
             <p:nvSpPr>
               <p:cNvPr id="79" name="TextBox 78">
@@ -3534,7 +3302,7 @@
             </p:nvSpPr>
             <p:spPr>
               <a:xfrm>
-                <a:off x="147277" y="11421969"/>
+                <a:off x="150519" y="11632220"/>
                 <a:ext cx="697275" cy="570926"/>
               </a:xfrm>
               <a:prstGeom prst="rect">
@@ -3592,7 +3360,7 @@
             </p:txBody>
           </p:sp>
         </mc:Choice>
-        <mc:Fallback xmlns="">
+        <mc:Fallback>
           <p:sp>
             <p:nvSpPr>
               <p:cNvPr id="79" name="TextBox 78">
@@ -3609,16 +3377,16 @@
             </p:nvSpPr>
             <p:spPr>
               <a:xfrm>
-                <a:off x="147277" y="11421969"/>
+                <a:off x="150519" y="11632220"/>
                 <a:ext cx="697275" cy="570926"/>
               </a:xfrm>
               <a:prstGeom prst="rect">
                 <a:avLst/>
               </a:prstGeom>
               <a:blipFill>
-                <a:blip r:embed="rId15"/>
+                <a:blip r:embed="rId3"/>
                 <a:stretch>
-                  <a:fillRect l="-5455"/>
+                  <a:fillRect l="-5455" t="-2174"/>
                 </a:stretch>
               </a:blipFill>
             </p:spPr>
@@ -3637,66 +3405,6 @@
           </p:sp>
         </mc:Fallback>
       </mc:AlternateContent>
-      <p:pic>
-        <p:nvPicPr>
-          <p:cNvPr id="3" name="Picture 2">
-            <a:extLst>
-              <a:ext uri="{FF2B5EF4-FFF2-40B4-BE49-F238E27FC236}">
-                <a16:creationId xmlns:a16="http://schemas.microsoft.com/office/drawing/2014/main" id="{3F6114F0-DBE3-D543-92AD-BAC56481B576}"/>
-              </a:ext>
-            </a:extLst>
-          </p:cNvPr>
-          <p:cNvPicPr>
-            <a:picLocks noChangeAspect="1"/>
-          </p:cNvPicPr>
-          <p:nvPr/>
-        </p:nvPicPr>
-        <p:blipFill>
-          <a:blip r:embed="rId16"/>
-          <a:stretch>
-            <a:fillRect/>
-          </a:stretch>
-        </p:blipFill>
-        <p:spPr>
-          <a:xfrm>
-            <a:off x="845668" y="2571426"/>
-            <a:ext cx="1105389" cy="1124697"/>
-          </a:xfrm>
-          <a:prstGeom prst="rect">
-            <a:avLst/>
-          </a:prstGeom>
-        </p:spPr>
-      </p:pic>
-      <p:pic>
-        <p:nvPicPr>
-          <p:cNvPr id="5" name="Picture 4">
-            <a:extLst>
-              <a:ext uri="{FF2B5EF4-FFF2-40B4-BE49-F238E27FC236}">
-                <a16:creationId xmlns:a16="http://schemas.microsoft.com/office/drawing/2014/main" id="{56F3AD5D-72D0-7849-ADE6-917A04344280}"/>
-              </a:ext>
-            </a:extLst>
-          </p:cNvPr>
-          <p:cNvPicPr>
-            <a:picLocks noChangeAspect="1"/>
-          </p:cNvPicPr>
-          <p:nvPr/>
-        </p:nvPicPr>
-        <p:blipFill>
-          <a:blip r:embed="rId17"/>
-          <a:stretch>
-            <a:fillRect/>
-          </a:stretch>
-        </p:blipFill>
-        <p:spPr>
-          <a:xfrm>
-            <a:off x="2411351" y="2102476"/>
-            <a:ext cx="2183645" cy="2183645"/>
-          </a:xfrm>
-          <a:prstGeom prst="rect">
-            <a:avLst/>
-          </a:prstGeom>
-        </p:spPr>
-      </p:pic>
       <p:sp>
         <p:nvSpPr>
           <p:cNvPr id="6" name="Oval 5">
@@ -3911,10 +3619,10 @@
       </p:sp>
       <p:sp>
         <p:nvSpPr>
-          <p:cNvPr id="30" name="Oval 29">
+          <p:cNvPr id="14" name="Rectangle 13">
             <a:extLst>
               <a:ext uri="{FF2B5EF4-FFF2-40B4-BE49-F238E27FC236}">
-                <a16:creationId xmlns:a16="http://schemas.microsoft.com/office/drawing/2014/main" id="{68E024CD-FEEB-5143-A070-FE3E03F87489}"/>
+                <a16:creationId xmlns:a16="http://schemas.microsoft.com/office/drawing/2014/main" id="{F225A04F-0A2D-F547-B9B7-37913E58D0A4}"/>
               </a:ext>
             </a:extLst>
           </p:cNvPr>
@@ -3923,19 +3631,17 @@
         </p:nvSpPr>
         <p:spPr>
           <a:xfrm>
-            <a:off x="3641678" y="9611749"/>
-            <a:ext cx="45719" cy="45719"/>
-          </a:xfrm>
-          <a:prstGeom prst="ellipse">
+            <a:off x="2151797" y="10445087"/>
+            <a:ext cx="407763" cy="306127"/>
+          </a:xfrm>
+          <a:prstGeom prst="rect">
             <a:avLst/>
           </a:prstGeom>
           <a:solidFill>
-            <a:srgbClr val="00B050"/>
+            <a:schemeClr val="bg1"/>
           </a:solidFill>
           <a:ln>
-            <a:solidFill>
-              <a:srgbClr val="00B050"/>
-            </a:solidFill>
+            <a:noFill/>
           </a:ln>
         </p:spPr>
         <p:style>
@@ -3963,276 +3669,6 @@
           </a:p>
         </p:txBody>
       </p:sp>
-      <p:sp>
-        <p:nvSpPr>
-          <p:cNvPr id="31" name="TextBox 30">
-            <a:extLst>
-              <a:ext uri="{FF2B5EF4-FFF2-40B4-BE49-F238E27FC236}">
-                <a16:creationId xmlns:a16="http://schemas.microsoft.com/office/drawing/2014/main" id="{878ED30F-A8EE-4845-B3DB-686BDED5BC00}"/>
-              </a:ext>
-            </a:extLst>
-          </p:cNvPr>
-          <p:cNvSpPr txBox="1"/>
-          <p:nvPr/>
-        </p:nvSpPr>
-        <p:spPr>
-          <a:xfrm>
-            <a:off x="3528061" y="9573338"/>
-            <a:ext cx="514066" cy="307777"/>
-          </a:xfrm>
-          <a:prstGeom prst="rect">
-            <a:avLst/>
-          </a:prstGeom>
-          <a:noFill/>
-        </p:spPr>
-        <p:txBody>
-          <a:bodyPr wrap="square" rtlCol="0">
-            <a:spAutoFit/>
-          </a:bodyPr>
-          <a:lstStyle/>
-          <a:p>
-            <a:r>
-              <a:rPr lang="en-US" sz="1400" i="1" dirty="0">
-                <a:latin typeface="Times" pitchFamily="2" charset="0"/>
-              </a:rPr>
-              <a:t>△</a:t>
-            </a:r>
-            <a:r>
-              <a:rPr lang="en-US" sz="1400" i="1" dirty="0" err="1">
-                <a:latin typeface="Times" pitchFamily="2" charset="0"/>
-              </a:rPr>
-              <a:t>g</a:t>
-            </a:r>
-            <a:r>
-              <a:rPr lang="en-US" sz="1400" i="1" baseline="-25000" dirty="0" err="1">
-                <a:latin typeface="Times" pitchFamily="2" charset="0"/>
-              </a:rPr>
-              <a:t>c</a:t>
-            </a:r>
-            <a:endParaRPr lang="en-US" sz="1400" i="1" dirty="0">
-              <a:latin typeface="Times" pitchFamily="2" charset="0"/>
-            </a:endParaRPr>
-          </a:p>
-        </p:txBody>
-      </p:sp>
-      <p:sp>
-        <p:nvSpPr>
-          <p:cNvPr id="34" name="Oval 33">
-            <a:extLst>
-              <a:ext uri="{FF2B5EF4-FFF2-40B4-BE49-F238E27FC236}">
-                <a16:creationId xmlns:a16="http://schemas.microsoft.com/office/drawing/2014/main" id="{A2B67A5D-8E62-614B-925F-74A879A80B95}"/>
-              </a:ext>
-            </a:extLst>
-          </p:cNvPr>
-          <p:cNvSpPr/>
-          <p:nvPr/>
-        </p:nvSpPr>
-        <p:spPr>
-          <a:xfrm>
-            <a:off x="3739375" y="1112712"/>
-            <a:ext cx="45719" cy="45719"/>
-          </a:xfrm>
-          <a:prstGeom prst="ellipse">
-            <a:avLst/>
-          </a:prstGeom>
-          <a:solidFill>
-            <a:srgbClr val="00B050"/>
-          </a:solidFill>
-          <a:ln>
-            <a:solidFill>
-              <a:srgbClr val="00B050"/>
-            </a:solidFill>
-          </a:ln>
-        </p:spPr>
-        <p:style>
-          <a:lnRef idx="2">
-            <a:schemeClr val="accent1">
-              <a:shade val="50000"/>
-            </a:schemeClr>
-          </a:lnRef>
-          <a:fillRef idx="1">
-            <a:schemeClr val="accent1"/>
-          </a:fillRef>
-          <a:effectRef idx="0">
-            <a:schemeClr val="accent1"/>
-          </a:effectRef>
-          <a:fontRef idx="minor">
-            <a:schemeClr val="lt1"/>
-          </a:fontRef>
-        </p:style>
-        <p:txBody>
-          <a:bodyPr rtlCol="0" anchor="ctr"/>
-          <a:lstStyle/>
-          <a:p>
-            <a:pPr algn="ctr"/>
-            <a:endParaRPr lang="en-US"/>
-          </a:p>
-        </p:txBody>
-      </p:sp>
-      <p:sp>
-        <p:nvSpPr>
-          <p:cNvPr id="35" name="TextBox 34">
-            <a:extLst>
-              <a:ext uri="{FF2B5EF4-FFF2-40B4-BE49-F238E27FC236}">
-                <a16:creationId xmlns:a16="http://schemas.microsoft.com/office/drawing/2014/main" id="{D96BC985-F7A1-3043-B65A-557D5BF6DF5A}"/>
-              </a:ext>
-            </a:extLst>
-          </p:cNvPr>
-          <p:cNvSpPr txBox="1"/>
-          <p:nvPr/>
-        </p:nvSpPr>
-        <p:spPr>
-          <a:xfrm>
-            <a:off x="3589363" y="1086179"/>
-            <a:ext cx="514066" cy="307777"/>
-          </a:xfrm>
-          <a:prstGeom prst="rect">
-            <a:avLst/>
-          </a:prstGeom>
-          <a:noFill/>
-        </p:spPr>
-        <p:txBody>
-          <a:bodyPr wrap="square" rtlCol="0">
-            <a:spAutoFit/>
-          </a:bodyPr>
-          <a:lstStyle/>
-          <a:p>
-            <a:r>
-              <a:rPr lang="en-US" sz="1400" i="1" dirty="0">
-                <a:latin typeface="Times" pitchFamily="2" charset="0"/>
-              </a:rPr>
-              <a:t>△</a:t>
-            </a:r>
-            <a:r>
-              <a:rPr lang="en-US" sz="1400" i="1" dirty="0" err="1">
-                <a:latin typeface="Times" pitchFamily="2" charset="0"/>
-              </a:rPr>
-              <a:t>g</a:t>
-            </a:r>
-            <a:r>
-              <a:rPr lang="en-US" sz="1400" i="1" baseline="-25000" dirty="0" err="1">
-                <a:latin typeface="Times" pitchFamily="2" charset="0"/>
-              </a:rPr>
-              <a:t>c</a:t>
-            </a:r>
-            <a:endParaRPr lang="en-US" sz="1400" i="1" dirty="0">
-              <a:latin typeface="Times" pitchFamily="2" charset="0"/>
-            </a:endParaRPr>
-          </a:p>
-        </p:txBody>
-      </p:sp>
-      <p:pic>
-        <p:nvPicPr>
-          <p:cNvPr id="11" name="Picture 10">
-            <a:extLst>
-              <a:ext uri="{FF2B5EF4-FFF2-40B4-BE49-F238E27FC236}">
-                <a16:creationId xmlns:a16="http://schemas.microsoft.com/office/drawing/2014/main" id="{9BEC8289-D3FE-2849-8342-658AFF1383A8}"/>
-              </a:ext>
-            </a:extLst>
-          </p:cNvPr>
-          <p:cNvPicPr>
-            <a:picLocks noChangeAspect="1"/>
-          </p:cNvPicPr>
-          <p:nvPr/>
-        </p:nvPicPr>
-        <p:blipFill>
-          <a:blip r:embed="rId18"/>
-          <a:stretch>
-            <a:fillRect/>
-          </a:stretch>
-        </p:blipFill>
-        <p:spPr>
-          <a:xfrm>
-            <a:off x="896742" y="11184888"/>
-            <a:ext cx="1045087" cy="1045087"/>
-          </a:xfrm>
-          <a:prstGeom prst="rect">
-            <a:avLst/>
-          </a:prstGeom>
-        </p:spPr>
-      </p:pic>
-      <p:pic>
-        <p:nvPicPr>
-          <p:cNvPr id="13" name="Picture 12">
-            <a:extLst>
-              <a:ext uri="{FF2B5EF4-FFF2-40B4-BE49-F238E27FC236}">
-                <a16:creationId xmlns:a16="http://schemas.microsoft.com/office/drawing/2014/main" id="{29EC029A-BC26-AE41-BD76-DB69DC52AA66}"/>
-              </a:ext>
-            </a:extLst>
-          </p:cNvPr>
-          <p:cNvPicPr>
-            <a:picLocks noChangeAspect="1"/>
-          </p:cNvPicPr>
-          <p:nvPr/>
-        </p:nvPicPr>
-        <p:blipFill>
-          <a:blip r:embed="rId19"/>
-          <a:stretch>
-            <a:fillRect/>
-          </a:stretch>
-        </p:blipFill>
-        <p:spPr>
-          <a:xfrm>
-            <a:off x="2398841" y="10581457"/>
-            <a:ext cx="2106666" cy="2102304"/>
-          </a:xfrm>
-          <a:prstGeom prst="rect">
-            <a:avLst/>
-          </a:prstGeom>
-        </p:spPr>
-      </p:pic>
-      <p:sp>
-        <p:nvSpPr>
-          <p:cNvPr id="14" name="Rectangle 13">
-            <a:extLst>
-              <a:ext uri="{FF2B5EF4-FFF2-40B4-BE49-F238E27FC236}">
-                <a16:creationId xmlns:a16="http://schemas.microsoft.com/office/drawing/2014/main" id="{F225A04F-0A2D-F547-B9B7-37913E58D0A4}"/>
-              </a:ext>
-            </a:extLst>
-          </p:cNvPr>
-          <p:cNvSpPr/>
-          <p:nvPr/>
-        </p:nvSpPr>
-        <p:spPr>
-          <a:xfrm>
-            <a:off x="2151797" y="10445087"/>
-            <a:ext cx="407763" cy="306127"/>
-          </a:xfrm>
-          <a:prstGeom prst="rect">
-            <a:avLst/>
-          </a:prstGeom>
-          <a:solidFill>
-            <a:schemeClr val="bg1"/>
-          </a:solidFill>
-          <a:ln>
-            <a:noFill/>
-          </a:ln>
-        </p:spPr>
-        <p:style>
-          <a:lnRef idx="2">
-            <a:schemeClr val="accent1">
-              <a:shade val="50000"/>
-            </a:schemeClr>
-          </a:lnRef>
-          <a:fillRef idx="1">
-            <a:schemeClr val="accent1"/>
-          </a:fillRef>
-          <a:effectRef idx="0">
-            <a:schemeClr val="accent1"/>
-          </a:effectRef>
-          <a:fontRef idx="minor">
-            <a:schemeClr val="lt1"/>
-          </a:fontRef>
-        </p:style>
-        <p:txBody>
-          <a:bodyPr rtlCol="0" anchor="ctr"/>
-          <a:lstStyle/>
-          <a:p>
-            <a:pPr algn="ctr"/>
-            <a:endParaRPr lang="en-US"/>
-          </a:p>
-        </p:txBody>
-      </p:sp>
       <p:pic>
         <p:nvPicPr>
           <p:cNvPr id="4" name="Picture 3">
@@ -4247,16 +3683,372 @@
           </p:cNvPicPr>
           <p:nvPr/>
         </p:nvPicPr>
+        <p:blipFill rotWithShape="1">
+          <a:blip r:embed="rId4"/>
+          <a:srcRect b="42181"/>
+          <a:stretch/>
+        </p:blipFill>
+        <p:spPr>
+          <a:xfrm>
+            <a:off x="663771" y="1890216"/>
+            <a:ext cx="1192883" cy="271517"/>
+          </a:xfrm>
+          <a:prstGeom prst="rect">
+            <a:avLst/>
+          </a:prstGeom>
+        </p:spPr>
+      </p:pic>
+      <p:pic>
+        <p:nvPicPr>
+          <p:cNvPr id="8" name="Picture 7">
+            <a:extLst>
+              <a:ext uri="{FF2B5EF4-FFF2-40B4-BE49-F238E27FC236}">
+                <a16:creationId xmlns:a16="http://schemas.microsoft.com/office/drawing/2014/main" id="{9D97F61C-5F1C-5B41-B614-9E67E0682881}"/>
+              </a:ext>
+            </a:extLst>
+          </p:cNvPr>
+          <p:cNvPicPr>
+            <a:picLocks noChangeAspect="1"/>
+          </p:cNvPicPr>
+          <p:nvPr/>
+        </p:nvPicPr>
         <p:blipFill>
-          <a:blip r:embed="rId20"/>
+          <a:blip r:embed="rId5"/>
           <a:stretch>
             <a:fillRect/>
           </a:stretch>
         </p:blipFill>
         <p:spPr>
           <a:xfrm>
-            <a:off x="663771" y="1890216"/>
-            <a:ext cx="1192883" cy="469597"/>
+            <a:off x="2489353" y="-24743"/>
+            <a:ext cx="1830362" cy="2107390"/>
+          </a:xfrm>
+          <a:prstGeom prst="rect">
+            <a:avLst/>
+          </a:prstGeom>
+        </p:spPr>
+      </p:pic>
+      <p:pic>
+        <p:nvPicPr>
+          <p:cNvPr id="10" name="Picture 9">
+            <a:extLst>
+              <a:ext uri="{FF2B5EF4-FFF2-40B4-BE49-F238E27FC236}">
+                <a16:creationId xmlns:a16="http://schemas.microsoft.com/office/drawing/2014/main" id="{A5DF8763-F35B-054E-8E4C-B2379630FC0B}"/>
+              </a:ext>
+            </a:extLst>
+          </p:cNvPr>
+          <p:cNvPicPr>
+            <a:picLocks noChangeAspect="1"/>
+          </p:cNvPicPr>
+          <p:nvPr/>
+        </p:nvPicPr>
+        <p:blipFill>
+          <a:blip r:embed="rId6"/>
+          <a:stretch>
+            <a:fillRect/>
+          </a:stretch>
+        </p:blipFill>
+        <p:spPr>
+          <a:xfrm>
+            <a:off x="2282656" y="2050237"/>
+            <a:ext cx="2289344" cy="2289344"/>
+          </a:xfrm>
+          <a:prstGeom prst="rect">
+            <a:avLst/>
+          </a:prstGeom>
+        </p:spPr>
+      </p:pic>
+      <p:pic>
+        <p:nvPicPr>
+          <p:cNvPr id="15" name="Picture 14">
+            <a:extLst>
+              <a:ext uri="{FF2B5EF4-FFF2-40B4-BE49-F238E27FC236}">
+                <a16:creationId xmlns:a16="http://schemas.microsoft.com/office/drawing/2014/main" id="{572C88C3-6349-B240-B49A-70535C52FB0A}"/>
+              </a:ext>
+            </a:extLst>
+          </p:cNvPr>
+          <p:cNvPicPr>
+            <a:picLocks noChangeAspect="1"/>
+          </p:cNvPicPr>
+          <p:nvPr/>
+        </p:nvPicPr>
+        <p:blipFill>
+          <a:blip r:embed="rId7"/>
+          <a:stretch>
+            <a:fillRect/>
+          </a:stretch>
+        </p:blipFill>
+        <p:spPr>
+          <a:xfrm>
+            <a:off x="2355678" y="4296940"/>
+            <a:ext cx="2092856" cy="2190198"/>
+          </a:xfrm>
+          <a:prstGeom prst="rect">
+            <a:avLst/>
+          </a:prstGeom>
+        </p:spPr>
+      </p:pic>
+      <p:pic>
+        <p:nvPicPr>
+          <p:cNvPr id="19" name="Picture 18">
+            <a:extLst>
+              <a:ext uri="{FF2B5EF4-FFF2-40B4-BE49-F238E27FC236}">
+                <a16:creationId xmlns:a16="http://schemas.microsoft.com/office/drawing/2014/main" id="{3C26D2B7-5D4D-C341-ADFB-7734B36F070E}"/>
+              </a:ext>
+            </a:extLst>
+          </p:cNvPr>
+          <p:cNvPicPr>
+            <a:picLocks noChangeAspect="1"/>
+          </p:cNvPicPr>
+          <p:nvPr/>
+        </p:nvPicPr>
+        <p:blipFill>
+          <a:blip r:embed="rId8"/>
+          <a:stretch>
+            <a:fillRect/>
+          </a:stretch>
+        </p:blipFill>
+        <p:spPr>
+          <a:xfrm>
+            <a:off x="2368084" y="6470190"/>
+            <a:ext cx="2068043" cy="2068043"/>
+          </a:xfrm>
+          <a:prstGeom prst="rect">
+            <a:avLst/>
+          </a:prstGeom>
+        </p:spPr>
+      </p:pic>
+      <p:pic>
+        <p:nvPicPr>
+          <p:cNvPr id="21" name="Picture 20">
+            <a:extLst>
+              <a:ext uri="{FF2B5EF4-FFF2-40B4-BE49-F238E27FC236}">
+                <a16:creationId xmlns:a16="http://schemas.microsoft.com/office/drawing/2014/main" id="{AEB91762-24E4-9548-9AE3-AD25AFDDBC44}"/>
+              </a:ext>
+            </a:extLst>
+          </p:cNvPr>
+          <p:cNvPicPr>
+            <a:picLocks noChangeAspect="1"/>
+          </p:cNvPicPr>
+          <p:nvPr/>
+        </p:nvPicPr>
+        <p:blipFill>
+          <a:blip r:embed="rId9"/>
+          <a:stretch>
+            <a:fillRect/>
+          </a:stretch>
+        </p:blipFill>
+        <p:spPr>
+          <a:xfrm>
+            <a:off x="2327378" y="8629690"/>
+            <a:ext cx="2199899" cy="2094686"/>
+          </a:xfrm>
+          <a:prstGeom prst="rect">
+            <a:avLst/>
+          </a:prstGeom>
+        </p:spPr>
+      </p:pic>
+      <p:pic>
+        <p:nvPicPr>
+          <p:cNvPr id="23" name="Picture 22">
+            <a:extLst>
+              <a:ext uri="{FF2B5EF4-FFF2-40B4-BE49-F238E27FC236}">
+                <a16:creationId xmlns:a16="http://schemas.microsoft.com/office/drawing/2014/main" id="{56020EAF-D61E-054A-9CC5-42652FADFCBD}"/>
+              </a:ext>
+            </a:extLst>
+          </p:cNvPr>
+          <p:cNvPicPr>
+            <a:picLocks noChangeAspect="1"/>
+          </p:cNvPicPr>
+          <p:nvPr/>
+        </p:nvPicPr>
+        <p:blipFill>
+          <a:blip r:embed="rId10"/>
+          <a:stretch>
+            <a:fillRect/>
+          </a:stretch>
+        </p:blipFill>
+        <p:spPr>
+          <a:xfrm>
+            <a:off x="931526" y="458565"/>
+            <a:ext cx="1019531" cy="1140773"/>
+          </a:xfrm>
+          <a:prstGeom prst="rect">
+            <a:avLst/>
+          </a:prstGeom>
+        </p:spPr>
+      </p:pic>
+      <p:pic>
+        <p:nvPicPr>
+          <p:cNvPr id="25" name="Picture 24">
+            <a:extLst>
+              <a:ext uri="{FF2B5EF4-FFF2-40B4-BE49-F238E27FC236}">
+                <a16:creationId xmlns:a16="http://schemas.microsoft.com/office/drawing/2014/main" id="{2A8F99F0-4FB1-BC4E-9C53-17BA15B22E41}"/>
+              </a:ext>
+            </a:extLst>
+          </p:cNvPr>
+          <p:cNvPicPr>
+            <a:picLocks noChangeAspect="1"/>
+          </p:cNvPicPr>
+          <p:nvPr/>
+        </p:nvPicPr>
+        <p:blipFill rotWithShape="1">
+          <a:blip r:embed="rId11"/>
+          <a:srcRect t="9442"/>
+          <a:stretch/>
+        </p:blipFill>
+        <p:spPr>
+          <a:xfrm>
+            <a:off x="856302" y="2614990"/>
+            <a:ext cx="1177721" cy="1159837"/>
+          </a:xfrm>
+          <a:prstGeom prst="rect">
+            <a:avLst/>
+          </a:prstGeom>
+        </p:spPr>
+      </p:pic>
+      <p:pic>
+        <p:nvPicPr>
+          <p:cNvPr id="27" name="Picture 26">
+            <a:extLst>
+              <a:ext uri="{FF2B5EF4-FFF2-40B4-BE49-F238E27FC236}">
+                <a16:creationId xmlns:a16="http://schemas.microsoft.com/office/drawing/2014/main" id="{3CC69F6F-82B7-9044-9F66-CE1601D91428}"/>
+              </a:ext>
+            </a:extLst>
+          </p:cNvPr>
+          <p:cNvPicPr>
+            <a:picLocks noChangeAspect="1"/>
+          </p:cNvPicPr>
+          <p:nvPr/>
+        </p:nvPicPr>
+        <p:blipFill>
+          <a:blip r:embed="rId12"/>
+          <a:stretch>
+            <a:fillRect/>
+          </a:stretch>
+        </p:blipFill>
+        <p:spPr>
+          <a:xfrm>
+            <a:off x="966292" y="4785406"/>
+            <a:ext cx="1067731" cy="1128455"/>
+          </a:xfrm>
+          <a:prstGeom prst="rect">
+            <a:avLst/>
+          </a:prstGeom>
+        </p:spPr>
+      </p:pic>
+      <p:pic>
+        <p:nvPicPr>
+          <p:cNvPr id="33" name="Picture 32">
+            <a:extLst>
+              <a:ext uri="{FF2B5EF4-FFF2-40B4-BE49-F238E27FC236}">
+                <a16:creationId xmlns:a16="http://schemas.microsoft.com/office/drawing/2014/main" id="{DBFB7587-90EC-E84E-90B9-222AC5C08C34}"/>
+              </a:ext>
+            </a:extLst>
+          </p:cNvPr>
+          <p:cNvPicPr>
+            <a:picLocks noChangeAspect="1"/>
+          </p:cNvPicPr>
+          <p:nvPr/>
+        </p:nvPicPr>
+        <p:blipFill>
+          <a:blip r:embed="rId13"/>
+          <a:stretch>
+            <a:fillRect/>
+          </a:stretch>
+        </p:blipFill>
+        <p:spPr>
+          <a:xfrm>
+            <a:off x="931526" y="6924440"/>
+            <a:ext cx="1137550" cy="1201252"/>
+          </a:xfrm>
+          <a:prstGeom prst="rect">
+            <a:avLst/>
+          </a:prstGeom>
+        </p:spPr>
+      </p:pic>
+      <p:pic>
+        <p:nvPicPr>
+          <p:cNvPr id="37" name="Picture 36">
+            <a:extLst>
+              <a:ext uri="{FF2B5EF4-FFF2-40B4-BE49-F238E27FC236}">
+                <a16:creationId xmlns:a16="http://schemas.microsoft.com/office/drawing/2014/main" id="{83A7F9F9-5599-2C41-B9A2-C6854402FBDE}"/>
+              </a:ext>
+            </a:extLst>
+          </p:cNvPr>
+          <p:cNvPicPr>
+            <a:picLocks noChangeAspect="1"/>
+          </p:cNvPicPr>
+          <p:nvPr/>
+        </p:nvPicPr>
+        <p:blipFill rotWithShape="1">
+          <a:blip r:embed="rId14"/>
+          <a:srcRect t="6258"/>
+          <a:stretch/>
+        </p:blipFill>
+        <p:spPr>
+          <a:xfrm>
+            <a:off x="953176" y="9136271"/>
+            <a:ext cx="1093962" cy="1093266"/>
+          </a:xfrm>
+          <a:prstGeom prst="rect">
+            <a:avLst/>
+          </a:prstGeom>
+        </p:spPr>
+      </p:pic>
+      <p:pic>
+        <p:nvPicPr>
+          <p:cNvPr id="39" name="Picture 38">
+            <a:extLst>
+              <a:ext uri="{FF2B5EF4-FFF2-40B4-BE49-F238E27FC236}">
+                <a16:creationId xmlns:a16="http://schemas.microsoft.com/office/drawing/2014/main" id="{E2D98F87-ED0F-2942-8512-DD869F72AC08}"/>
+              </a:ext>
+            </a:extLst>
+          </p:cNvPr>
+          <p:cNvPicPr>
+            <a:picLocks noChangeAspect="1"/>
+          </p:cNvPicPr>
+          <p:nvPr/>
+        </p:nvPicPr>
+        <p:blipFill>
+          <a:blip r:embed="rId15"/>
+          <a:stretch>
+            <a:fillRect/>
+          </a:stretch>
+        </p:blipFill>
+        <p:spPr>
+          <a:xfrm>
+            <a:off x="931526" y="11240116"/>
+            <a:ext cx="1065254" cy="1108734"/>
+          </a:xfrm>
+          <a:prstGeom prst="rect">
+            <a:avLst/>
+          </a:prstGeom>
+        </p:spPr>
+      </p:pic>
+      <p:pic>
+        <p:nvPicPr>
+          <p:cNvPr id="41" name="Picture 40">
+            <a:extLst>
+              <a:ext uri="{FF2B5EF4-FFF2-40B4-BE49-F238E27FC236}">
+                <a16:creationId xmlns:a16="http://schemas.microsoft.com/office/drawing/2014/main" id="{D561106E-1511-0744-8671-3911114E9AE1}"/>
+              </a:ext>
+            </a:extLst>
+          </p:cNvPr>
+          <p:cNvPicPr>
+            <a:picLocks noChangeAspect="1"/>
+          </p:cNvPicPr>
+          <p:nvPr/>
+        </p:nvPicPr>
+        <p:blipFill rotWithShape="1">
+          <a:blip r:embed="rId16"/>
+          <a:srcRect t="4139"/>
+          <a:stretch/>
+        </p:blipFill>
+        <p:spPr>
+          <a:xfrm>
+            <a:off x="2368084" y="10689489"/>
+            <a:ext cx="2159193" cy="2124749"/>
           </a:xfrm>
           <a:prstGeom prst="rect">
             <a:avLst/>

</xml_diff>

<commit_message>
added captions but without delta g.
</commit_message>
<xml_diff>
--- a/journalWallFriction/pictures/pdf/differentNumSides.pptx
+++ b/journalWallFriction/pictures/pdf/differentNumSides.pptx
@@ -3671,35 +3671,6 @@
       </p:sp>
       <p:pic>
         <p:nvPicPr>
-          <p:cNvPr id="4" name="Picture 3">
-            <a:extLst>
-              <a:ext uri="{FF2B5EF4-FFF2-40B4-BE49-F238E27FC236}">
-                <a16:creationId xmlns:a16="http://schemas.microsoft.com/office/drawing/2014/main" id="{FCE0EF5F-E280-CA49-8A49-74D75E52FA4C}"/>
-              </a:ext>
-            </a:extLst>
-          </p:cNvPr>
-          <p:cNvPicPr>
-            <a:picLocks noChangeAspect="1"/>
-          </p:cNvPicPr>
-          <p:nvPr/>
-        </p:nvPicPr>
-        <p:blipFill rotWithShape="1">
-          <a:blip r:embed="rId4"/>
-          <a:srcRect b="42181"/>
-          <a:stretch/>
-        </p:blipFill>
-        <p:spPr>
-          <a:xfrm>
-            <a:off x="663771" y="1890216"/>
-            <a:ext cx="1192883" cy="271517"/>
-          </a:xfrm>
-          <a:prstGeom prst="rect">
-            <a:avLst/>
-          </a:prstGeom>
-        </p:spPr>
-      </p:pic>
-      <p:pic>
-        <p:nvPicPr>
           <p:cNvPr id="8" name="Picture 7">
             <a:extLst>
               <a:ext uri="{FF2B5EF4-FFF2-40B4-BE49-F238E27FC236}">
@@ -3713,7 +3684,7 @@
           <p:nvPr/>
         </p:nvPicPr>
         <p:blipFill>
-          <a:blip r:embed="rId5"/>
+          <a:blip r:embed="rId4"/>
           <a:stretch>
             <a:fillRect/>
           </a:stretch>
@@ -3743,7 +3714,7 @@
           <p:nvPr/>
         </p:nvPicPr>
         <p:blipFill>
-          <a:blip r:embed="rId6"/>
+          <a:blip r:embed="rId5"/>
           <a:stretch>
             <a:fillRect/>
           </a:stretch>
@@ -3773,7 +3744,7 @@
           <p:nvPr/>
         </p:nvPicPr>
         <p:blipFill>
-          <a:blip r:embed="rId7"/>
+          <a:blip r:embed="rId6"/>
           <a:stretch>
             <a:fillRect/>
           </a:stretch>
@@ -3803,7 +3774,7 @@
           <p:nvPr/>
         </p:nvPicPr>
         <p:blipFill>
-          <a:blip r:embed="rId8"/>
+          <a:blip r:embed="rId7"/>
           <a:stretch>
             <a:fillRect/>
           </a:stretch>
@@ -3833,7 +3804,7 @@
           <p:nvPr/>
         </p:nvPicPr>
         <p:blipFill>
-          <a:blip r:embed="rId9"/>
+          <a:blip r:embed="rId8"/>
           <a:stretch>
             <a:fillRect/>
           </a:stretch>
@@ -3863,7 +3834,7 @@
           <p:nvPr/>
         </p:nvPicPr>
         <p:blipFill>
-          <a:blip r:embed="rId10"/>
+          <a:blip r:embed="rId9"/>
           <a:stretch>
             <a:fillRect/>
           </a:stretch>
@@ -3893,7 +3864,7 @@
           <p:nvPr/>
         </p:nvPicPr>
         <p:blipFill rotWithShape="1">
-          <a:blip r:embed="rId11"/>
+          <a:blip r:embed="rId10"/>
           <a:srcRect t="9442"/>
           <a:stretch/>
         </p:blipFill>
@@ -3922,7 +3893,7 @@
           <p:nvPr/>
         </p:nvPicPr>
         <p:blipFill>
-          <a:blip r:embed="rId12"/>
+          <a:blip r:embed="rId11"/>
           <a:stretch>
             <a:fillRect/>
           </a:stretch>
@@ -3952,7 +3923,7 @@
           <p:nvPr/>
         </p:nvPicPr>
         <p:blipFill>
-          <a:blip r:embed="rId13"/>
+          <a:blip r:embed="rId12"/>
           <a:stretch>
             <a:fillRect/>
           </a:stretch>
@@ -3982,7 +3953,7 @@
           <p:nvPr/>
         </p:nvPicPr>
         <p:blipFill rotWithShape="1">
-          <a:blip r:embed="rId14"/>
+          <a:blip r:embed="rId13"/>
           <a:srcRect t="6258"/>
           <a:stretch/>
         </p:blipFill>
@@ -4011,7 +3982,7 @@
           <p:nvPr/>
         </p:nvPicPr>
         <p:blipFill>
-          <a:blip r:embed="rId15"/>
+          <a:blip r:embed="rId14"/>
           <a:stretch>
             <a:fillRect/>
           </a:stretch>
@@ -4041,7 +4012,7 @@
           <p:nvPr/>
         </p:nvPicPr>
         <p:blipFill rotWithShape="1">
-          <a:blip r:embed="rId16"/>
+          <a:blip r:embed="rId15"/>
           <a:srcRect t="4139"/>
           <a:stretch/>
         </p:blipFill>
@@ -4055,6 +4026,686 @@
           </a:prstGeom>
         </p:spPr>
       </p:pic>
+      <p:sp>
+        <p:nvSpPr>
+          <p:cNvPr id="91" name="TextBox 90">
+            <a:extLst>
+              <a:ext uri="{FF2B5EF4-FFF2-40B4-BE49-F238E27FC236}">
+                <a16:creationId xmlns:a16="http://schemas.microsoft.com/office/drawing/2014/main" id="{45DFC902-F80B-4444-A772-22CCBA8238E9}"/>
+              </a:ext>
+            </a:extLst>
+          </p:cNvPr>
+          <p:cNvSpPr txBox="1"/>
+          <p:nvPr/>
+        </p:nvSpPr>
+        <p:spPr>
+          <a:xfrm>
+            <a:off x="0" y="1580772"/>
+            <a:ext cx="5787216" cy="1446550"/>
+          </a:xfrm>
+          <a:prstGeom prst="rect">
+            <a:avLst/>
+          </a:prstGeom>
+          <a:noFill/>
+        </p:spPr>
+        <p:txBody>
+          <a:bodyPr wrap="square" rtlCol="0">
+            <a:spAutoFit/>
+          </a:bodyPr>
+          <a:lstStyle/>
+          <a:p>
+            <a:r>
+              <a:rPr lang="en-US" sz="2000" dirty="0" err="1">
+                <a:latin typeface="Times" pitchFamily="2" charset="0"/>
+              </a:rPr>
+              <a:t>Δ</a:t>
+            </a:r>
+            <a:r>
+              <a:rPr lang="en-US" sz="2000" i="1" dirty="0" err="1">
+                <a:latin typeface="Times" pitchFamily="2" charset="0"/>
+              </a:rPr>
+              <a:t>s</a:t>
+            </a:r>
+            <a:r>
+              <a:rPr lang="en-US" sz="2800" i="1" dirty="0">
+                <a:latin typeface="Times" pitchFamily="2" charset="0"/>
+              </a:rPr>
+              <a:t>	</a:t>
+            </a:r>
+            <a:r>
+              <a:rPr lang="en-US" sz="2800" dirty="0">
+                <a:latin typeface="Times" pitchFamily="2" charset="0"/>
+              </a:rPr>
+              <a:t>=    −  </a:t>
+            </a:r>
+          </a:p>
+          <a:p>
+            <a:r>
+              <a:rPr lang="fa-IR" sz="2000" dirty="0">
+                <a:latin typeface="Times" pitchFamily="2" charset="0"/>
+              </a:rPr>
+              <a:t>    </a:t>
+            </a:r>
+            <a:r>
+              <a:rPr lang="en-US" sz="2000" dirty="0">
+                <a:latin typeface="Times" pitchFamily="2" charset="0"/>
+              </a:rPr>
+              <a:t>2-move reachable set</a:t>
+            </a:r>
+          </a:p>
+          <a:p>
+            <a:r>
+              <a:rPr lang="en-US" sz="2000" dirty="0">
+                <a:latin typeface="Times" pitchFamily="2" charset="0"/>
+              </a:rPr>
+              <a:t>    4-move reachable set</a:t>
+            </a:r>
+          </a:p>
+          <a:p>
+            <a:r>
+              <a:rPr lang="en-US" sz="2000" dirty="0">
+                <a:latin typeface="Times" pitchFamily="2" charset="0"/>
+              </a:rPr>
+              <a:t>    </a:t>
+            </a:r>
+          </a:p>
+        </p:txBody>
+      </p:sp>
+      <p:sp>
+        <p:nvSpPr>
+          <p:cNvPr id="92" name="Rectangle 91">
+            <a:extLst>
+              <a:ext uri="{FF2B5EF4-FFF2-40B4-BE49-F238E27FC236}">
+                <a16:creationId xmlns:a16="http://schemas.microsoft.com/office/drawing/2014/main" id="{78981FE7-708B-6D47-92AD-D013939EE842}"/>
+              </a:ext>
+            </a:extLst>
+          </p:cNvPr>
+          <p:cNvSpPr/>
+          <p:nvPr/>
+        </p:nvSpPr>
+        <p:spPr>
+          <a:xfrm>
+            <a:off x="149476" y="2127255"/>
+            <a:ext cx="159792" cy="159792"/>
+          </a:xfrm>
+          <a:prstGeom prst="rect">
+            <a:avLst/>
+          </a:prstGeom>
+          <a:solidFill>
+            <a:srgbClr val="0022F2"/>
+          </a:solidFill>
+          <a:ln>
+            <a:solidFill>
+              <a:schemeClr val="tx1"/>
+            </a:solidFill>
+          </a:ln>
+        </p:spPr>
+        <p:style>
+          <a:lnRef idx="2">
+            <a:schemeClr val="accent1">
+              <a:shade val="50000"/>
+            </a:schemeClr>
+          </a:lnRef>
+          <a:fillRef idx="1">
+            <a:schemeClr val="accent1"/>
+          </a:fillRef>
+          <a:effectRef idx="0">
+            <a:schemeClr val="accent1"/>
+          </a:effectRef>
+          <a:fontRef idx="minor">
+            <a:schemeClr val="lt1"/>
+          </a:fontRef>
+        </p:style>
+        <p:txBody>
+          <a:bodyPr rot="0" spcFirstLastPara="0" vertOverflow="overflow" horzOverflow="overflow" vert="horz" wrap="square" lIns="91440" tIns="45720" rIns="91440" bIns="45720" numCol="1" spcCol="0" rtlCol="0" fromWordArt="0" anchor="ctr" anchorCtr="0" forceAA="0" compatLnSpc="1">
+            <a:prstTxWarp prst="textNoShape">
+              <a:avLst/>
+            </a:prstTxWarp>
+            <a:noAutofit/>
+          </a:bodyPr>
+          <a:lstStyle/>
+          <a:p>
+            <a:pPr marL="0" algn="ctr" defTabSz="790042" rtl="1" eaLnBrk="1" latinLnBrk="0" hangingPunct="1"/>
+            <a:endParaRPr lang="en-US"/>
+          </a:p>
+        </p:txBody>
+      </p:sp>
+      <p:sp>
+        <p:nvSpPr>
+          <p:cNvPr id="93" name="Rectangle 92">
+            <a:extLst>
+              <a:ext uri="{FF2B5EF4-FFF2-40B4-BE49-F238E27FC236}">
+                <a16:creationId xmlns:a16="http://schemas.microsoft.com/office/drawing/2014/main" id="{1CDD98B9-4641-9842-A335-D1E53798FBD8}"/>
+              </a:ext>
+            </a:extLst>
+          </p:cNvPr>
+          <p:cNvSpPr/>
+          <p:nvPr/>
+        </p:nvSpPr>
+        <p:spPr>
+          <a:xfrm>
+            <a:off x="148755" y="2454815"/>
+            <a:ext cx="159792" cy="159792"/>
+          </a:xfrm>
+          <a:prstGeom prst="rect">
+            <a:avLst/>
+          </a:prstGeom>
+          <a:solidFill>
+            <a:srgbClr val="BA7231"/>
+          </a:solidFill>
+          <a:ln>
+            <a:solidFill>
+              <a:schemeClr val="tx1"/>
+            </a:solidFill>
+          </a:ln>
+        </p:spPr>
+        <p:style>
+          <a:lnRef idx="2">
+            <a:schemeClr val="accent1">
+              <a:shade val="50000"/>
+            </a:schemeClr>
+          </a:lnRef>
+          <a:fillRef idx="1">
+            <a:schemeClr val="accent1"/>
+          </a:fillRef>
+          <a:effectRef idx="0">
+            <a:schemeClr val="accent1"/>
+          </a:effectRef>
+          <a:fontRef idx="minor">
+            <a:schemeClr val="lt1"/>
+          </a:fontRef>
+        </p:style>
+        <p:txBody>
+          <a:bodyPr rot="0" spcFirstLastPara="0" vertOverflow="overflow" horzOverflow="overflow" vert="horz" wrap="square" lIns="91440" tIns="45720" rIns="91440" bIns="45720" numCol="1" spcCol="0" rtlCol="0" fromWordArt="0" anchor="ctr" anchorCtr="0" forceAA="0" compatLnSpc="1">
+            <a:prstTxWarp prst="textNoShape">
+              <a:avLst/>
+            </a:prstTxWarp>
+            <a:noAutofit/>
+          </a:bodyPr>
+          <a:lstStyle/>
+          <a:p>
+            <a:pPr marL="0" algn="ctr" defTabSz="790042" rtl="1" eaLnBrk="1" latinLnBrk="0" hangingPunct="1"/>
+            <a:endParaRPr lang="en-US"/>
+          </a:p>
+        </p:txBody>
+      </p:sp>
+      <p:sp>
+        <p:nvSpPr>
+          <p:cNvPr id="94" name="Rectangle 93">
+            <a:extLst>
+              <a:ext uri="{FF2B5EF4-FFF2-40B4-BE49-F238E27FC236}">
+                <a16:creationId xmlns:a16="http://schemas.microsoft.com/office/drawing/2014/main" id="{4D21352D-8BDF-B841-B305-D8A1614E7068}"/>
+              </a:ext>
+            </a:extLst>
+          </p:cNvPr>
+          <p:cNvSpPr/>
+          <p:nvPr/>
+        </p:nvSpPr>
+        <p:spPr>
+          <a:xfrm>
+            <a:off x="141252" y="3954710"/>
+            <a:ext cx="159792" cy="159792"/>
+          </a:xfrm>
+          <a:prstGeom prst="rect">
+            <a:avLst/>
+          </a:prstGeom>
+          <a:solidFill>
+            <a:srgbClr val="847AAE"/>
+          </a:solidFill>
+          <a:ln>
+            <a:solidFill>
+              <a:schemeClr val="tx1"/>
+            </a:solidFill>
+          </a:ln>
+        </p:spPr>
+        <p:style>
+          <a:lnRef idx="2">
+            <a:schemeClr val="accent1">
+              <a:shade val="50000"/>
+            </a:schemeClr>
+          </a:lnRef>
+          <a:fillRef idx="1">
+            <a:schemeClr val="accent1"/>
+          </a:fillRef>
+          <a:effectRef idx="0">
+            <a:schemeClr val="accent1"/>
+          </a:effectRef>
+          <a:fontRef idx="minor">
+            <a:schemeClr val="lt1"/>
+          </a:fontRef>
+        </p:style>
+        <p:txBody>
+          <a:bodyPr rot="0" spcFirstLastPara="0" vertOverflow="overflow" horzOverflow="overflow" vert="horz" wrap="square" lIns="91440" tIns="45720" rIns="91440" bIns="45720" numCol="1" spcCol="0" rtlCol="0" fromWordArt="0" anchor="ctr" anchorCtr="0" forceAA="0" compatLnSpc="1">
+            <a:prstTxWarp prst="textNoShape">
+              <a:avLst/>
+            </a:prstTxWarp>
+            <a:noAutofit/>
+          </a:bodyPr>
+          <a:lstStyle/>
+          <a:p>
+            <a:pPr marL="0" algn="ctr" defTabSz="790042" rtl="1" eaLnBrk="1" latinLnBrk="0" hangingPunct="1"/>
+            <a:r>
+              <a:rPr lang="fa-IR" dirty="0"/>
+              <a:t>     </a:t>
+            </a:r>
+            <a:endParaRPr lang="en-US" dirty="0"/>
+          </a:p>
+        </p:txBody>
+      </p:sp>
+      <p:sp>
+        <p:nvSpPr>
+          <p:cNvPr id="95" name="Rectangle 94">
+            <a:extLst>
+              <a:ext uri="{FF2B5EF4-FFF2-40B4-BE49-F238E27FC236}">
+                <a16:creationId xmlns:a16="http://schemas.microsoft.com/office/drawing/2014/main" id="{A98BA7EC-1A0F-4F46-BA2A-D6FB4AEDECCF}"/>
+              </a:ext>
+            </a:extLst>
+          </p:cNvPr>
+          <p:cNvSpPr/>
+          <p:nvPr/>
+        </p:nvSpPr>
+        <p:spPr>
+          <a:xfrm>
+            <a:off x="596482" y="1768313"/>
+            <a:ext cx="149752" cy="149752"/>
+          </a:xfrm>
+          <a:prstGeom prst="rect">
+            <a:avLst/>
+          </a:prstGeom>
+          <a:solidFill>
+            <a:srgbClr val="4CA62F"/>
+          </a:solidFill>
+          <a:ln>
+            <a:noFill/>
+          </a:ln>
+        </p:spPr>
+        <p:style>
+          <a:lnRef idx="2">
+            <a:schemeClr val="accent1">
+              <a:shade val="50000"/>
+            </a:schemeClr>
+          </a:lnRef>
+          <a:fillRef idx="1">
+            <a:schemeClr val="accent1"/>
+          </a:fillRef>
+          <a:effectRef idx="0">
+            <a:schemeClr val="accent1"/>
+          </a:effectRef>
+          <a:fontRef idx="minor">
+            <a:schemeClr val="lt1"/>
+          </a:fontRef>
+        </p:style>
+        <p:txBody>
+          <a:bodyPr rot="0" spcFirstLastPara="0" vertOverflow="overflow" horzOverflow="overflow" vert="horz" wrap="square" lIns="91440" tIns="45720" rIns="91440" bIns="45720" numCol="1" spcCol="0" rtlCol="0" fromWordArt="0" anchor="ctr" anchorCtr="0" forceAA="0" compatLnSpc="1">
+            <a:prstTxWarp prst="textNoShape">
+              <a:avLst/>
+            </a:prstTxWarp>
+            <a:noAutofit/>
+          </a:bodyPr>
+          <a:lstStyle/>
+          <a:p>
+            <a:pPr marL="0" algn="ctr" defTabSz="914400" rtl="1" eaLnBrk="1" latinLnBrk="0" hangingPunct="1"/>
+            <a:endParaRPr lang="en-US"/>
+          </a:p>
+        </p:txBody>
+      </p:sp>
+      <p:sp>
+        <p:nvSpPr>
+          <p:cNvPr id="96" name="Rectangle 95">
+            <a:extLst>
+              <a:ext uri="{FF2B5EF4-FFF2-40B4-BE49-F238E27FC236}">
+                <a16:creationId xmlns:a16="http://schemas.microsoft.com/office/drawing/2014/main" id="{8E5CF19B-BB31-3440-A316-AC53EB02F724}"/>
+              </a:ext>
+            </a:extLst>
+          </p:cNvPr>
+          <p:cNvSpPr/>
+          <p:nvPr/>
+        </p:nvSpPr>
+        <p:spPr>
+          <a:xfrm>
+            <a:off x="1736478" y="1767265"/>
+            <a:ext cx="149752" cy="149752"/>
+          </a:xfrm>
+          <a:prstGeom prst="rect">
+            <a:avLst/>
+          </a:prstGeom>
+          <a:solidFill>
+            <a:srgbClr val="0022F2"/>
+          </a:solidFill>
+          <a:ln>
+            <a:noFill/>
+          </a:ln>
+        </p:spPr>
+        <p:style>
+          <a:lnRef idx="2">
+            <a:schemeClr val="accent1">
+              <a:shade val="50000"/>
+            </a:schemeClr>
+          </a:lnRef>
+          <a:fillRef idx="1">
+            <a:schemeClr val="accent1"/>
+          </a:fillRef>
+          <a:effectRef idx="0">
+            <a:schemeClr val="accent1"/>
+          </a:effectRef>
+          <a:fontRef idx="minor">
+            <a:schemeClr val="lt1"/>
+          </a:fontRef>
+        </p:style>
+        <p:txBody>
+          <a:bodyPr rot="0" spcFirstLastPara="0" vertOverflow="overflow" horzOverflow="overflow" vert="horz" wrap="square" lIns="91440" tIns="45720" rIns="91440" bIns="45720" numCol="1" spcCol="0" rtlCol="0" fromWordArt="0" anchor="ctr" anchorCtr="0" forceAA="0" compatLnSpc="1">
+            <a:prstTxWarp prst="textNoShape">
+              <a:avLst/>
+            </a:prstTxWarp>
+            <a:noAutofit/>
+          </a:bodyPr>
+          <a:lstStyle/>
+          <a:p>
+            <a:pPr marL="0" algn="ctr" defTabSz="790042" rtl="1" eaLnBrk="1" latinLnBrk="0" hangingPunct="1"/>
+            <a:endParaRPr lang="en-US"/>
+          </a:p>
+        </p:txBody>
+      </p:sp>
+      <p:sp>
+        <p:nvSpPr>
+          <p:cNvPr id="97" name="Rectangle 96">
+            <a:extLst>
+              <a:ext uri="{FF2B5EF4-FFF2-40B4-BE49-F238E27FC236}">
+                <a16:creationId xmlns:a16="http://schemas.microsoft.com/office/drawing/2014/main" id="{B68BCD98-BA77-9B45-AC94-FD99D168EFF8}"/>
+              </a:ext>
+            </a:extLst>
+          </p:cNvPr>
+          <p:cNvSpPr/>
+          <p:nvPr/>
+        </p:nvSpPr>
+        <p:spPr>
+          <a:xfrm>
+            <a:off x="1206741" y="1767265"/>
+            <a:ext cx="149752" cy="149752"/>
+          </a:xfrm>
+          <a:prstGeom prst="rect">
+            <a:avLst/>
+          </a:prstGeom>
+          <a:solidFill>
+            <a:srgbClr val="FF0000"/>
+          </a:solidFill>
+          <a:ln>
+            <a:noFill/>
+          </a:ln>
+        </p:spPr>
+        <p:style>
+          <a:lnRef idx="2">
+            <a:schemeClr val="accent1">
+              <a:shade val="50000"/>
+            </a:schemeClr>
+          </a:lnRef>
+          <a:fillRef idx="1">
+            <a:schemeClr val="accent1"/>
+          </a:fillRef>
+          <a:effectRef idx="0">
+            <a:schemeClr val="accent1"/>
+          </a:effectRef>
+          <a:fontRef idx="minor">
+            <a:schemeClr val="lt1"/>
+          </a:fontRef>
+        </p:style>
+        <p:txBody>
+          <a:bodyPr rot="0" spcFirstLastPara="0" vertOverflow="overflow" horzOverflow="overflow" vert="horz" wrap="square" lIns="91440" tIns="45720" rIns="91440" bIns="45720" numCol="1" spcCol="0" rtlCol="0" fromWordArt="0" anchor="ctr" anchorCtr="0" forceAA="0" compatLnSpc="1">
+            <a:prstTxWarp prst="textNoShape">
+              <a:avLst/>
+            </a:prstTxWarp>
+            <a:noAutofit/>
+          </a:bodyPr>
+          <a:lstStyle/>
+          <a:p>
+            <a:pPr marL="0" algn="ctr" defTabSz="790042" rtl="1" eaLnBrk="1" latinLnBrk="0" hangingPunct="1"/>
+            <a:endParaRPr lang="en-US"/>
+          </a:p>
+        </p:txBody>
+      </p:sp>
+      <p:sp>
+        <p:nvSpPr>
+          <p:cNvPr id="42" name="TextBox 41">
+            <a:extLst>
+              <a:ext uri="{FF2B5EF4-FFF2-40B4-BE49-F238E27FC236}">
+                <a16:creationId xmlns:a16="http://schemas.microsoft.com/office/drawing/2014/main" id="{52EAC71E-C53B-FE44-AAAC-FEC53CBDD140}"/>
+              </a:ext>
+            </a:extLst>
+          </p:cNvPr>
+          <p:cNvSpPr txBox="1"/>
+          <p:nvPr/>
+        </p:nvSpPr>
+        <p:spPr>
+          <a:xfrm>
+            <a:off x="301044" y="3833135"/>
+            <a:ext cx="2338860" cy="400110"/>
+          </a:xfrm>
+          <a:prstGeom prst="rect">
+            <a:avLst/>
+          </a:prstGeom>
+          <a:noFill/>
+        </p:spPr>
+        <p:txBody>
+          <a:bodyPr wrap="square" rtlCol="0">
+            <a:spAutoFit/>
+          </a:bodyPr>
+          <a:lstStyle/>
+          <a:p>
+            <a:pPr rtl="1"/>
+            <a:r>
+              <a:rPr lang="en-US" sz="2000" dirty="0">
+                <a:latin typeface="Times" pitchFamily="2" charset="0"/>
+              </a:rPr>
+              <a:t>6-move reachable set</a:t>
+            </a:r>
+            <a:endParaRPr lang="en-US" sz="2000" dirty="0"/>
+          </a:p>
+        </p:txBody>
+      </p:sp>
+      <p:sp>
+        <p:nvSpPr>
+          <p:cNvPr id="101" name="Rectangle 100">
+            <a:extLst>
+              <a:ext uri="{FF2B5EF4-FFF2-40B4-BE49-F238E27FC236}">
+                <a16:creationId xmlns:a16="http://schemas.microsoft.com/office/drawing/2014/main" id="{0D6A7E9C-0FA3-D94D-8B69-AC37E77F9401}"/>
+              </a:ext>
+            </a:extLst>
+          </p:cNvPr>
+          <p:cNvSpPr/>
+          <p:nvPr/>
+        </p:nvSpPr>
+        <p:spPr>
+          <a:xfrm>
+            <a:off x="141252" y="10559777"/>
+            <a:ext cx="159792" cy="159792"/>
+          </a:xfrm>
+          <a:prstGeom prst="rect">
+            <a:avLst/>
+          </a:prstGeom>
+          <a:solidFill>
+            <a:srgbClr val="EC6234"/>
+          </a:solidFill>
+          <a:ln>
+            <a:solidFill>
+              <a:schemeClr val="tx1"/>
+            </a:solidFill>
+          </a:ln>
+        </p:spPr>
+        <p:style>
+          <a:lnRef idx="2">
+            <a:schemeClr val="accent1">
+              <a:shade val="50000"/>
+            </a:schemeClr>
+          </a:lnRef>
+          <a:fillRef idx="1">
+            <a:schemeClr val="accent1"/>
+          </a:fillRef>
+          <a:effectRef idx="0">
+            <a:schemeClr val="accent1"/>
+          </a:effectRef>
+          <a:fontRef idx="minor">
+            <a:schemeClr val="lt1"/>
+          </a:fontRef>
+        </p:style>
+        <p:txBody>
+          <a:bodyPr rot="0" spcFirstLastPara="0" vertOverflow="overflow" horzOverflow="overflow" vert="horz" wrap="square" lIns="91440" tIns="45720" rIns="91440" bIns="45720" numCol="1" spcCol="0" rtlCol="0" fromWordArt="0" anchor="ctr" anchorCtr="0" forceAA="0" compatLnSpc="1">
+            <a:prstTxWarp prst="textNoShape">
+              <a:avLst/>
+            </a:prstTxWarp>
+            <a:noAutofit/>
+          </a:bodyPr>
+          <a:lstStyle/>
+          <a:p>
+            <a:pPr marL="0" algn="ctr" defTabSz="790042" rtl="1" eaLnBrk="1" latinLnBrk="0" hangingPunct="1"/>
+            <a:r>
+              <a:rPr lang="fa-IR" dirty="0"/>
+              <a:t>     </a:t>
+            </a:r>
+            <a:endParaRPr lang="en-US" dirty="0"/>
+          </a:p>
+        </p:txBody>
+      </p:sp>
+      <p:sp>
+        <p:nvSpPr>
+          <p:cNvPr id="102" name="TextBox 101">
+            <a:extLst>
+              <a:ext uri="{FF2B5EF4-FFF2-40B4-BE49-F238E27FC236}">
+                <a16:creationId xmlns:a16="http://schemas.microsoft.com/office/drawing/2014/main" id="{9638012C-72C2-9046-85D0-8106220345A5}"/>
+              </a:ext>
+            </a:extLst>
+          </p:cNvPr>
+          <p:cNvSpPr txBox="1"/>
+          <p:nvPr/>
+        </p:nvSpPr>
+        <p:spPr>
+          <a:xfrm>
+            <a:off x="301044" y="10438202"/>
+            <a:ext cx="2338860" cy="400110"/>
+          </a:xfrm>
+          <a:prstGeom prst="rect">
+            <a:avLst/>
+          </a:prstGeom>
+          <a:noFill/>
+        </p:spPr>
+        <p:txBody>
+          <a:bodyPr wrap="square" rtlCol="0">
+            <a:spAutoFit/>
+          </a:bodyPr>
+          <a:lstStyle/>
+          <a:p>
+            <a:pPr rtl="1"/>
+            <a:r>
+              <a:rPr lang="en-US" sz="2000" dirty="0">
+                <a:latin typeface="Times" pitchFamily="2" charset="0"/>
+              </a:rPr>
+              <a:t>8-move reachable set</a:t>
+            </a:r>
+            <a:endParaRPr lang="en-US" sz="2000" dirty="0"/>
+          </a:p>
+        </p:txBody>
+      </p:sp>
+      <p:sp>
+        <p:nvSpPr>
+          <p:cNvPr id="103" name="Rectangle 102">
+            <a:extLst>
+              <a:ext uri="{FF2B5EF4-FFF2-40B4-BE49-F238E27FC236}">
+                <a16:creationId xmlns:a16="http://schemas.microsoft.com/office/drawing/2014/main" id="{864BF1C7-13E0-AC48-850C-50DC21C23C7D}"/>
+              </a:ext>
+            </a:extLst>
+          </p:cNvPr>
+          <p:cNvSpPr/>
+          <p:nvPr/>
+        </p:nvSpPr>
+        <p:spPr>
+          <a:xfrm>
+            <a:off x="148755" y="12410911"/>
+            <a:ext cx="159792" cy="159792"/>
+          </a:xfrm>
+          <a:prstGeom prst="rect">
+            <a:avLst/>
+          </a:prstGeom>
+          <a:solidFill>
+            <a:srgbClr val="91B033"/>
+          </a:solidFill>
+          <a:ln>
+            <a:solidFill>
+              <a:schemeClr val="tx1"/>
+            </a:solidFill>
+          </a:ln>
+        </p:spPr>
+        <p:style>
+          <a:lnRef idx="2">
+            <a:schemeClr val="accent1">
+              <a:shade val="50000"/>
+            </a:schemeClr>
+          </a:lnRef>
+          <a:fillRef idx="1">
+            <a:schemeClr val="accent1"/>
+          </a:fillRef>
+          <a:effectRef idx="0">
+            <a:schemeClr val="accent1"/>
+          </a:effectRef>
+          <a:fontRef idx="minor">
+            <a:schemeClr val="lt1"/>
+          </a:fontRef>
+        </p:style>
+        <p:txBody>
+          <a:bodyPr rot="0" spcFirstLastPara="0" vertOverflow="overflow" horzOverflow="overflow" vert="horz" wrap="square" lIns="91440" tIns="45720" rIns="91440" bIns="45720" numCol="1" spcCol="0" rtlCol="0" fromWordArt="0" anchor="ctr" anchorCtr="0" forceAA="0" compatLnSpc="1">
+            <a:prstTxWarp prst="textNoShape">
+              <a:avLst/>
+            </a:prstTxWarp>
+            <a:noAutofit/>
+          </a:bodyPr>
+          <a:lstStyle/>
+          <a:p>
+            <a:pPr marL="0" algn="ctr" defTabSz="790042" rtl="1" eaLnBrk="1" latinLnBrk="0" hangingPunct="1"/>
+            <a:r>
+              <a:rPr lang="fa-IR" dirty="0"/>
+              <a:t>     </a:t>
+            </a:r>
+            <a:endParaRPr lang="en-US" dirty="0"/>
+          </a:p>
+        </p:txBody>
+      </p:sp>
+      <p:sp>
+        <p:nvSpPr>
+          <p:cNvPr id="104" name="TextBox 103">
+            <a:extLst>
+              <a:ext uri="{FF2B5EF4-FFF2-40B4-BE49-F238E27FC236}">
+                <a16:creationId xmlns:a16="http://schemas.microsoft.com/office/drawing/2014/main" id="{D64EAE51-CC52-ED4A-AF6B-A67B72346638}"/>
+              </a:ext>
+            </a:extLst>
+          </p:cNvPr>
+          <p:cNvSpPr txBox="1"/>
+          <p:nvPr/>
+        </p:nvSpPr>
+        <p:spPr>
+          <a:xfrm>
+            <a:off x="308546" y="12289336"/>
+            <a:ext cx="2520111" cy="400110"/>
+          </a:xfrm>
+          <a:prstGeom prst="rect">
+            <a:avLst/>
+          </a:prstGeom>
+          <a:noFill/>
+        </p:spPr>
+        <p:txBody>
+          <a:bodyPr wrap="square" rtlCol="0">
+            <a:spAutoFit/>
+          </a:bodyPr>
+          <a:lstStyle/>
+          <a:p>
+            <a:pPr rtl="1"/>
+            <a:r>
+              <a:rPr lang="en-US" sz="2000" dirty="0">
+                <a:latin typeface="Times" pitchFamily="2" charset="0"/>
+              </a:rPr>
+              <a:t>10-move reachable set</a:t>
+            </a:r>
+            <a:endParaRPr lang="en-US" sz="2000" dirty="0"/>
+          </a:p>
+        </p:txBody>
+      </p:sp>
     </p:spTree>
     <p:extLst>
       <p:ext uri="{BB962C8B-B14F-4D97-AF65-F5344CB8AC3E}">

</xml_diff>

<commit_message>
cleaned images, proofed test, and prepped letter
</commit_message>
<xml_diff>
--- a/journalWallFriction/pictures/pdf/differentNumSides.pptx
+++ b/journalWallFriction/pictures/pdf/differentNumSides.pptx
@@ -243,7 +243,7 @@
           <a:p>
             <a:fld id="{BD5E1F6D-FFA6-BC44-B9B8-BBE6A1110E96}" type="datetimeFigureOut">
               <a:rPr lang="en-US" smtClean="0"/>
-              <a:t>12/6/18</a:t>
+              <a:t>12/11/18</a:t>
             </a:fld>
             <a:endParaRPr lang="en-US"/>
           </a:p>
@@ -413,7 +413,7 @@
           <a:p>
             <a:fld id="{BD5E1F6D-FFA6-BC44-B9B8-BBE6A1110E96}" type="datetimeFigureOut">
               <a:rPr lang="en-US" smtClean="0"/>
-              <a:t>12/6/18</a:t>
+              <a:t>12/11/18</a:t>
             </a:fld>
             <a:endParaRPr lang="en-US"/>
           </a:p>
@@ -593,7 +593,7 @@
           <a:p>
             <a:fld id="{BD5E1F6D-FFA6-BC44-B9B8-BBE6A1110E96}" type="datetimeFigureOut">
               <a:rPr lang="en-US" smtClean="0"/>
-              <a:t>12/6/18</a:t>
+              <a:t>12/11/18</a:t>
             </a:fld>
             <a:endParaRPr lang="en-US"/>
           </a:p>
@@ -763,7 +763,7 @@
           <a:p>
             <a:fld id="{BD5E1F6D-FFA6-BC44-B9B8-BBE6A1110E96}" type="datetimeFigureOut">
               <a:rPr lang="en-US" smtClean="0"/>
-              <a:t>12/6/18</a:t>
+              <a:t>12/11/18</a:t>
             </a:fld>
             <a:endParaRPr lang="en-US"/>
           </a:p>
@@ -1007,7 +1007,7 @@
           <a:p>
             <a:fld id="{BD5E1F6D-FFA6-BC44-B9B8-BBE6A1110E96}" type="datetimeFigureOut">
               <a:rPr lang="en-US" smtClean="0"/>
-              <a:t>12/6/18</a:t>
+              <a:t>12/11/18</a:t>
             </a:fld>
             <a:endParaRPr lang="en-US"/>
           </a:p>
@@ -1239,7 +1239,7 @@
           <a:p>
             <a:fld id="{BD5E1F6D-FFA6-BC44-B9B8-BBE6A1110E96}" type="datetimeFigureOut">
               <a:rPr lang="en-US" smtClean="0"/>
-              <a:t>12/6/18</a:t>
+              <a:t>12/11/18</a:t>
             </a:fld>
             <a:endParaRPr lang="en-US"/>
           </a:p>
@@ -1606,7 +1606,7 @@
           <a:p>
             <a:fld id="{BD5E1F6D-FFA6-BC44-B9B8-BBE6A1110E96}" type="datetimeFigureOut">
               <a:rPr lang="en-US" smtClean="0"/>
-              <a:t>12/6/18</a:t>
+              <a:t>12/11/18</a:t>
             </a:fld>
             <a:endParaRPr lang="en-US"/>
           </a:p>
@@ -1724,7 +1724,7 @@
           <a:p>
             <a:fld id="{BD5E1F6D-FFA6-BC44-B9B8-BBE6A1110E96}" type="datetimeFigureOut">
               <a:rPr lang="en-US" smtClean="0"/>
-              <a:t>12/6/18</a:t>
+              <a:t>12/11/18</a:t>
             </a:fld>
             <a:endParaRPr lang="en-US"/>
           </a:p>
@@ -1819,7 +1819,7 @@
           <a:p>
             <a:fld id="{BD5E1F6D-FFA6-BC44-B9B8-BBE6A1110E96}" type="datetimeFigureOut">
               <a:rPr lang="en-US" smtClean="0"/>
-              <a:t>12/6/18</a:t>
+              <a:t>12/11/18</a:t>
             </a:fld>
             <a:endParaRPr lang="en-US"/>
           </a:p>
@@ -2096,7 +2096,7 @@
           <a:p>
             <a:fld id="{BD5E1F6D-FFA6-BC44-B9B8-BBE6A1110E96}" type="datetimeFigureOut">
               <a:rPr lang="en-US" smtClean="0"/>
-              <a:t>12/6/18</a:t>
+              <a:t>12/11/18</a:t>
             </a:fld>
             <a:endParaRPr lang="en-US"/>
           </a:p>
@@ -2353,7 +2353,7 @@
           <a:p>
             <a:fld id="{BD5E1F6D-FFA6-BC44-B9B8-BBE6A1110E96}" type="datetimeFigureOut">
               <a:rPr lang="en-US" smtClean="0"/>
-              <a:t>12/6/18</a:t>
+              <a:t>12/11/18</a:t>
             </a:fld>
             <a:endParaRPr lang="en-US"/>
           </a:p>
@@ -2566,7 +2566,7 @@
           <a:p>
             <a:fld id="{BD5E1F6D-FFA6-BC44-B9B8-BBE6A1110E96}" type="datetimeFigureOut">
               <a:rPr lang="en-US" smtClean="0"/>
-              <a:t>12/6/18</a:t>
+              <a:t>12/11/18</a:t>
             </a:fld>
             <a:endParaRPr lang="en-US"/>
           </a:p>
@@ -2985,7 +2985,7 @@
         </p:nvSpPr>
         <p:spPr>
           <a:xfrm>
-            <a:off x="164373" y="803943"/>
+            <a:off x="122451" y="803943"/>
             <a:ext cx="683421" cy="331629"/>
           </a:xfrm>
           <a:prstGeom prst="rect">
@@ -3032,7 +3032,7 @@
         </p:nvSpPr>
         <p:spPr>
           <a:xfrm>
-            <a:off x="164373" y="2967961"/>
+            <a:off x="122451" y="2967961"/>
             <a:ext cx="683421" cy="331629"/>
           </a:xfrm>
           <a:prstGeom prst="rect">
@@ -3126,7 +3126,7 @@
         </p:nvSpPr>
         <p:spPr>
           <a:xfrm>
-            <a:off x="164373" y="7408780"/>
+            <a:off x="122451" y="7231356"/>
             <a:ext cx="683421" cy="331629"/>
           </a:xfrm>
           <a:prstGeom prst="rect">
@@ -3159,8 +3159,8 @@
           </a:p>
         </p:txBody>
       </p:sp>
-      <mc:AlternateContent xmlns:mc="http://schemas.openxmlformats.org/markup-compatibility/2006">
-        <mc:Choice xmlns:a14="http://schemas.microsoft.com/office/drawing/2010/main" Requires="a14">
+      <mc:AlternateContent xmlns:mc="http://schemas.openxmlformats.org/markup-compatibility/2006" xmlns:a14="http://schemas.microsoft.com/office/drawing/2010/main">
+        <mc:Choice Requires="a14">
           <p:sp>
             <p:nvSpPr>
               <p:cNvPr id="78" name="TextBox 77">
@@ -3175,7 +3175,7 @@
             </p:nvSpPr>
             <p:spPr>
               <a:xfrm>
-                <a:off x="122451" y="9465473"/>
+                <a:off x="122451" y="9397233"/>
                 <a:ext cx="1020894" cy="570926"/>
               </a:xfrm>
               <a:prstGeom prst="rect">
@@ -3241,7 +3241,7 @@
             </p:txBody>
           </p:sp>
         </mc:Choice>
-        <mc:Fallback>
+        <mc:Fallback xmlns="">
           <p:sp>
             <p:nvSpPr>
               <p:cNvPr id="78" name="TextBox 77">
@@ -3258,7 +3258,7 @@
             </p:nvSpPr>
             <p:spPr>
               <a:xfrm>
-                <a:off x="122451" y="9465473"/>
+                <a:off x="122451" y="9397233"/>
                 <a:ext cx="1020894" cy="570926"/>
               </a:xfrm>
               <a:prstGeom prst="rect">
@@ -3267,7 +3267,7 @@
               <a:blipFill>
                 <a:blip r:embed="rId2"/>
                 <a:stretch>
-                  <a:fillRect l="-2469"/>
+                  <a:fillRect l="-2469" t="-2174"/>
                 </a:stretch>
               </a:blipFill>
             </p:spPr>
@@ -3286,8 +3286,8 @@
           </p:sp>
         </mc:Fallback>
       </mc:AlternateContent>
-      <mc:AlternateContent xmlns:mc="http://schemas.openxmlformats.org/markup-compatibility/2006">
-        <mc:Choice xmlns:a14="http://schemas.microsoft.com/office/drawing/2010/main" Requires="a14">
+      <mc:AlternateContent xmlns:mc="http://schemas.openxmlformats.org/markup-compatibility/2006" xmlns:a14="http://schemas.microsoft.com/office/drawing/2010/main">
+        <mc:Choice Requires="a14">
           <p:sp>
             <p:nvSpPr>
               <p:cNvPr id="79" name="TextBox 78">
@@ -3302,7 +3302,7 @@
             </p:nvSpPr>
             <p:spPr>
               <a:xfrm>
-                <a:off x="150519" y="11632220"/>
+                <a:off x="122451" y="11523036"/>
                 <a:ext cx="697275" cy="570926"/>
               </a:xfrm>
               <a:prstGeom prst="rect">
@@ -3360,7 +3360,7 @@
             </p:txBody>
           </p:sp>
         </mc:Choice>
-        <mc:Fallback>
+        <mc:Fallback xmlns="">
           <p:sp>
             <p:nvSpPr>
               <p:cNvPr id="79" name="TextBox 78">
@@ -3377,7 +3377,7 @@
             </p:nvSpPr>
             <p:spPr>
               <a:xfrm>
-                <a:off x="150519" y="11632220"/>
+                <a:off x="122451" y="11523036"/>
                 <a:ext cx="697275" cy="570926"/>
               </a:xfrm>
               <a:prstGeom prst="rect">
@@ -3386,7 +3386,7 @@
               <a:blipFill>
                 <a:blip r:embed="rId3"/>
                 <a:stretch>
-                  <a:fillRect l="-5455" t="-2174"/>
+                  <a:fillRect l="-3571" t="-2174"/>
                 </a:stretch>
               </a:blipFill>
             </p:spPr>
@@ -4076,7 +4076,7 @@
               <a:rPr lang="en-US" sz="1600" dirty="0">
                 <a:latin typeface="Times" pitchFamily="2" charset="0"/>
               </a:rPr>
-              <a:t>=    −  </a:t>
+              <a:t>=     −  </a:t>
             </a:r>
           </a:p>
           <a:p>
@@ -4102,7 +4102,7 @@
               <a:rPr lang="en-US" sz="1600" dirty="0">
                 <a:latin typeface="Times" pitchFamily="2" charset="0"/>
               </a:rPr>
-              <a:t>=    −  </a:t>
+              <a:t>=     −  </a:t>
             </a:r>
           </a:p>
           <a:p>
@@ -4263,7 +4263,7 @@
         </p:nvSpPr>
         <p:spPr>
           <a:xfrm>
-            <a:off x="141252" y="3954710"/>
+            <a:off x="221003" y="3922516"/>
             <a:ext cx="159792" cy="159792"/>
           </a:xfrm>
           <a:prstGeom prst="rect">
@@ -4326,7 +4326,7 @@
         </p:nvSpPr>
         <p:spPr>
           <a:xfrm>
-            <a:off x="691857" y="1658059"/>
+            <a:off x="760097" y="1656922"/>
             <a:ext cx="149752" cy="149752"/>
           </a:xfrm>
           <a:prstGeom prst="rect">
@@ -4383,7 +4383,7 @@
         </p:nvSpPr>
         <p:spPr>
           <a:xfrm>
-            <a:off x="1464153" y="1655785"/>
+            <a:off x="1515912" y="1656922"/>
             <a:ext cx="149752" cy="149752"/>
           </a:xfrm>
           <a:prstGeom prst="rect">
@@ -4440,7 +4440,7 @@
         </p:nvSpPr>
         <p:spPr>
           <a:xfrm>
-            <a:off x="1135173" y="1655785"/>
+            <a:off x="1176117" y="1656922"/>
             <a:ext cx="149752" cy="149752"/>
           </a:xfrm>
           <a:prstGeom prst="rect">
@@ -4497,7 +4497,7 @@
         </p:nvSpPr>
         <p:spPr>
           <a:xfrm>
-            <a:off x="301044" y="3833135"/>
+            <a:off x="415347" y="3833135"/>
             <a:ext cx="2338860" cy="338554"/>
           </a:xfrm>
           <a:prstGeom prst="rect">
@@ -4536,7 +4536,7 @@
         </p:nvSpPr>
         <p:spPr>
           <a:xfrm>
-            <a:off x="144534" y="10476874"/>
+            <a:off x="221003" y="10476874"/>
             <a:ext cx="159792" cy="159792"/>
           </a:xfrm>
           <a:prstGeom prst="rect">
@@ -4599,7 +4599,7 @@
         </p:nvSpPr>
         <p:spPr>
           <a:xfrm>
-            <a:off x="301044" y="10387493"/>
+            <a:off x="415347" y="10387493"/>
             <a:ext cx="2338860" cy="338554"/>
           </a:xfrm>
           <a:prstGeom prst="rect">
@@ -4638,7 +4638,7 @@
         </p:nvSpPr>
         <p:spPr>
           <a:xfrm>
-            <a:off x="139919" y="12552427"/>
+            <a:off x="221003" y="12552427"/>
             <a:ext cx="159792" cy="159792"/>
           </a:xfrm>
           <a:prstGeom prst="rect">
@@ -4701,7 +4701,7 @@
         </p:nvSpPr>
         <p:spPr>
           <a:xfrm>
-            <a:off x="380795" y="12463046"/>
+            <a:off x="415347" y="12463046"/>
             <a:ext cx="2520111" cy="338554"/>
           </a:xfrm>
           <a:prstGeom prst="rect">
@@ -4740,7 +4740,7 @@
         </p:nvSpPr>
         <p:spPr>
           <a:xfrm>
-            <a:off x="1464153" y="1873763"/>
+            <a:off x="1505097" y="1888482"/>
             <a:ext cx="171382" cy="171382"/>
           </a:xfrm>
           <a:prstGeom prst="ellipse">
@@ -4797,7 +4797,7 @@
         </p:nvSpPr>
         <p:spPr>
           <a:xfrm>
-            <a:off x="1120091" y="1884914"/>
+            <a:off x="1161035" y="1884215"/>
             <a:ext cx="179916" cy="179916"/>
           </a:xfrm>
           <a:prstGeom prst="ellipse">
@@ -4854,7 +4854,7 @@
         </p:nvSpPr>
         <p:spPr>
           <a:xfrm>
-            <a:off x="683292" y="1894667"/>
+            <a:off x="751532" y="1884215"/>
             <a:ext cx="179916" cy="179916"/>
           </a:xfrm>
           <a:prstGeom prst="ellipse">
@@ -4968,7 +4968,7 @@
         </p:nvSpPr>
         <p:spPr>
           <a:xfrm>
-            <a:off x="2742679" y="866449"/>
+            <a:off x="2749510" y="793165"/>
             <a:ext cx="555998" cy="338554"/>
           </a:xfrm>
           <a:prstGeom prst="rect">
@@ -5063,7 +5063,7 @@
         </p:nvSpPr>
         <p:spPr>
           <a:xfrm>
-            <a:off x="2749510" y="2958301"/>
+            <a:off x="2727723" y="2868969"/>
             <a:ext cx="555998" cy="338554"/>
           </a:xfrm>
           <a:prstGeom prst="rect">
@@ -5158,7 +5158,7 @@
         </p:nvSpPr>
         <p:spPr>
           <a:xfrm>
-            <a:off x="2749510" y="5179879"/>
+            <a:off x="2771959" y="4965431"/>
             <a:ext cx="555998" cy="338554"/>
           </a:xfrm>
           <a:prstGeom prst="rect">
@@ -5253,7 +5253,7 @@
         </p:nvSpPr>
         <p:spPr>
           <a:xfrm>
-            <a:off x="2738259" y="7366960"/>
+            <a:off x="2704288" y="7160236"/>
             <a:ext cx="555998" cy="338554"/>
           </a:xfrm>
           <a:prstGeom prst="rect">
@@ -5348,7 +5348,7 @@
         </p:nvSpPr>
         <p:spPr>
           <a:xfrm>
-            <a:off x="2749510" y="9474060"/>
+            <a:off x="2734853" y="9398682"/>
             <a:ext cx="555998" cy="338554"/>
           </a:xfrm>
           <a:prstGeom prst="rect">
@@ -5443,7 +5443,7 @@
         </p:nvSpPr>
         <p:spPr>
           <a:xfrm>
-            <a:off x="2778081" y="11790688"/>
+            <a:off x="2963733" y="11557884"/>
             <a:ext cx="555998" cy="338554"/>
           </a:xfrm>
           <a:prstGeom prst="rect">
@@ -5464,6 +5464,620 @@
               <a:t>Δg</a:t>
             </a:r>
             <a:endParaRPr lang="en-US" sz="1600" i="1" dirty="0"/>
+          </a:p>
+        </p:txBody>
+      </p:sp>
+      <p:sp>
+        <p:nvSpPr>
+          <p:cNvPr id="55" name="TextBox 54">
+            <a:extLst>
+              <a:ext uri="{FF2B5EF4-FFF2-40B4-BE49-F238E27FC236}">
+                <a16:creationId xmlns:a16="http://schemas.microsoft.com/office/drawing/2014/main" id="{B0909CBE-D191-1A46-9179-4603ED28285D}"/>
+              </a:ext>
+            </a:extLst>
+          </p:cNvPr>
+          <p:cNvSpPr txBox="1"/>
+          <p:nvPr/>
+        </p:nvSpPr>
+        <p:spPr>
+          <a:xfrm>
+            <a:off x="3705383" y="11751863"/>
+            <a:ext cx="555998" cy="338554"/>
+          </a:xfrm>
+          <a:prstGeom prst="rect">
+            <a:avLst/>
+          </a:prstGeom>
+          <a:noFill/>
+        </p:spPr>
+        <p:txBody>
+          <a:bodyPr wrap="square" rtlCol="0">
+            <a:spAutoFit/>
+          </a:bodyPr>
+          <a:lstStyle/>
+          <a:p>
+            <a:r>
+              <a:rPr lang="en-US" sz="1600" i="1" dirty="0" err="1">
+                <a:latin typeface="Times" pitchFamily="2" charset="0"/>
+              </a:rPr>
+              <a:t>Δs</a:t>
+            </a:r>
+            <a:endParaRPr lang="en-US" sz="1600" i="1" dirty="0"/>
+          </a:p>
+        </p:txBody>
+      </p:sp>
+      <p:sp>
+        <p:nvSpPr>
+          <p:cNvPr id="53" name="TextBox 52">
+            <a:extLst>
+              <a:ext uri="{FF2B5EF4-FFF2-40B4-BE49-F238E27FC236}">
+                <a16:creationId xmlns:a16="http://schemas.microsoft.com/office/drawing/2014/main" id="{B73BE0D3-DFA9-B24F-BBF3-D4664390BCDB}"/>
+              </a:ext>
+            </a:extLst>
+          </p:cNvPr>
+          <p:cNvSpPr txBox="1"/>
+          <p:nvPr/>
+        </p:nvSpPr>
+        <p:spPr>
+          <a:xfrm>
+            <a:off x="2771959" y="5170389"/>
+            <a:ext cx="555998" cy="338554"/>
+          </a:xfrm>
+          <a:prstGeom prst="rect">
+            <a:avLst/>
+          </a:prstGeom>
+          <a:noFill/>
+        </p:spPr>
+        <p:txBody>
+          <a:bodyPr wrap="square" rtlCol="0">
+            <a:spAutoFit/>
+          </a:bodyPr>
+          <a:lstStyle/>
+          <a:p>
+            <a:r>
+              <a:rPr lang="en-US" sz="1600" i="1" dirty="0" err="1">
+                <a:latin typeface="Times" pitchFamily="2" charset="0"/>
+              </a:rPr>
+              <a:t>Δg</a:t>
+            </a:r>
+            <a:r>
+              <a:rPr lang="en-US" sz="1600" i="1" baseline="-25000" dirty="0" err="1">
+                <a:latin typeface="Times" pitchFamily="2" charset="0"/>
+              </a:rPr>
+              <a:t>c</a:t>
+            </a:r>
+            <a:endParaRPr lang="en-US" sz="1600" i="1" dirty="0"/>
+          </a:p>
+        </p:txBody>
+      </p:sp>
+      <p:sp>
+        <p:nvSpPr>
+          <p:cNvPr id="2" name="Triangle 1">
+            <a:extLst>
+              <a:ext uri="{FF2B5EF4-FFF2-40B4-BE49-F238E27FC236}">
+                <a16:creationId xmlns:a16="http://schemas.microsoft.com/office/drawing/2014/main" id="{7D3D3DE5-C354-8147-B542-462BDD6D8CC3}"/>
+              </a:ext>
+            </a:extLst>
+          </p:cNvPr>
+          <p:cNvSpPr/>
+          <p:nvPr/>
+        </p:nvSpPr>
+        <p:spPr>
+          <a:xfrm>
+            <a:off x="3136883" y="5264779"/>
+            <a:ext cx="53034" cy="45719"/>
+          </a:xfrm>
+          <a:prstGeom prst="triangle">
+            <a:avLst/>
+          </a:prstGeom>
+          <a:solidFill>
+            <a:srgbClr val="6EFA63"/>
+          </a:solidFill>
+          <a:ln>
+            <a:noFill/>
+          </a:ln>
+        </p:spPr>
+        <p:style>
+          <a:lnRef idx="2">
+            <a:schemeClr val="accent1">
+              <a:shade val="50000"/>
+            </a:schemeClr>
+          </a:lnRef>
+          <a:fillRef idx="1">
+            <a:schemeClr val="accent1"/>
+          </a:fillRef>
+          <a:effectRef idx="0">
+            <a:schemeClr val="accent1"/>
+          </a:effectRef>
+          <a:fontRef idx="minor">
+            <a:schemeClr val="lt1"/>
+          </a:fontRef>
+        </p:style>
+        <p:txBody>
+          <a:bodyPr rtlCol="0" anchor="ctr"/>
+          <a:lstStyle/>
+          <a:p>
+            <a:pPr algn="ctr"/>
+            <a:endParaRPr lang="en-US"/>
+          </a:p>
+        </p:txBody>
+      </p:sp>
+      <p:sp>
+        <p:nvSpPr>
+          <p:cNvPr id="56" name="TextBox 55">
+            <a:extLst>
+              <a:ext uri="{FF2B5EF4-FFF2-40B4-BE49-F238E27FC236}">
+                <a16:creationId xmlns:a16="http://schemas.microsoft.com/office/drawing/2014/main" id="{4F2EB497-BFB6-B840-9F8E-7E0E6C8C5761}"/>
+              </a:ext>
+            </a:extLst>
+          </p:cNvPr>
+          <p:cNvSpPr txBox="1"/>
+          <p:nvPr/>
+        </p:nvSpPr>
+        <p:spPr>
+          <a:xfrm>
+            <a:off x="2707588" y="2633767"/>
+            <a:ext cx="555998" cy="338554"/>
+          </a:xfrm>
+          <a:prstGeom prst="rect">
+            <a:avLst/>
+          </a:prstGeom>
+          <a:noFill/>
+        </p:spPr>
+        <p:txBody>
+          <a:bodyPr wrap="square" rtlCol="0">
+            <a:spAutoFit/>
+          </a:bodyPr>
+          <a:lstStyle/>
+          <a:p>
+            <a:r>
+              <a:rPr lang="en-US" sz="1600" i="1" dirty="0" err="1">
+                <a:latin typeface="Times" pitchFamily="2" charset="0"/>
+              </a:rPr>
+              <a:t>Δg</a:t>
+            </a:r>
+            <a:r>
+              <a:rPr lang="en-US" sz="1600" i="1" baseline="-25000" dirty="0" err="1">
+                <a:latin typeface="Times" pitchFamily="2" charset="0"/>
+              </a:rPr>
+              <a:t>c</a:t>
+            </a:r>
+            <a:endParaRPr lang="en-US" sz="1600" i="1" dirty="0"/>
+          </a:p>
+        </p:txBody>
+      </p:sp>
+      <p:sp>
+        <p:nvSpPr>
+          <p:cNvPr id="57" name="Triangle 56">
+            <a:extLst>
+              <a:ext uri="{FF2B5EF4-FFF2-40B4-BE49-F238E27FC236}">
+                <a16:creationId xmlns:a16="http://schemas.microsoft.com/office/drawing/2014/main" id="{932FD07A-B183-5F4D-8F02-0DCEB03F1E55}"/>
+              </a:ext>
+            </a:extLst>
+          </p:cNvPr>
+          <p:cNvSpPr/>
+          <p:nvPr/>
+        </p:nvSpPr>
+        <p:spPr>
+          <a:xfrm>
+            <a:off x="3154964" y="2917067"/>
+            <a:ext cx="53034" cy="45719"/>
+          </a:xfrm>
+          <a:prstGeom prst="triangle">
+            <a:avLst/>
+          </a:prstGeom>
+          <a:solidFill>
+            <a:srgbClr val="6EFA63"/>
+          </a:solidFill>
+          <a:ln>
+            <a:noFill/>
+          </a:ln>
+        </p:spPr>
+        <p:style>
+          <a:lnRef idx="2">
+            <a:schemeClr val="accent1">
+              <a:shade val="50000"/>
+            </a:schemeClr>
+          </a:lnRef>
+          <a:fillRef idx="1">
+            <a:schemeClr val="accent1"/>
+          </a:fillRef>
+          <a:effectRef idx="0">
+            <a:schemeClr val="accent1"/>
+          </a:effectRef>
+          <a:fontRef idx="minor">
+            <a:schemeClr val="lt1"/>
+          </a:fontRef>
+        </p:style>
+        <p:txBody>
+          <a:bodyPr rtlCol="0" anchor="ctr"/>
+          <a:lstStyle/>
+          <a:p>
+            <a:pPr algn="ctr"/>
+            <a:endParaRPr lang="en-US"/>
+          </a:p>
+        </p:txBody>
+      </p:sp>
+      <p:sp>
+        <p:nvSpPr>
+          <p:cNvPr id="58" name="TextBox 57">
+            <a:extLst>
+              <a:ext uri="{FF2B5EF4-FFF2-40B4-BE49-F238E27FC236}">
+                <a16:creationId xmlns:a16="http://schemas.microsoft.com/office/drawing/2014/main" id="{63BD134E-DE9C-8942-A1AF-594DB19DAE95}"/>
+              </a:ext>
+            </a:extLst>
+          </p:cNvPr>
+          <p:cNvSpPr txBox="1"/>
+          <p:nvPr/>
+        </p:nvSpPr>
+        <p:spPr>
+          <a:xfrm>
+            <a:off x="2952964" y="449789"/>
+            <a:ext cx="555998" cy="338554"/>
+          </a:xfrm>
+          <a:prstGeom prst="rect">
+            <a:avLst/>
+          </a:prstGeom>
+          <a:noFill/>
+        </p:spPr>
+        <p:txBody>
+          <a:bodyPr wrap="square" rtlCol="0">
+            <a:spAutoFit/>
+          </a:bodyPr>
+          <a:lstStyle/>
+          <a:p>
+            <a:r>
+              <a:rPr lang="en-US" sz="1600" i="1" dirty="0" err="1">
+                <a:latin typeface="Times" pitchFamily="2" charset="0"/>
+              </a:rPr>
+              <a:t>Δg</a:t>
+            </a:r>
+            <a:r>
+              <a:rPr lang="en-US" sz="1600" i="1" baseline="-25000" dirty="0" err="1">
+                <a:latin typeface="Times" pitchFamily="2" charset="0"/>
+              </a:rPr>
+              <a:t>c</a:t>
+            </a:r>
+            <a:endParaRPr lang="en-US" sz="1600" i="1" dirty="0"/>
+          </a:p>
+        </p:txBody>
+      </p:sp>
+      <p:sp>
+        <p:nvSpPr>
+          <p:cNvPr id="59" name="Triangle 58">
+            <a:extLst>
+              <a:ext uri="{FF2B5EF4-FFF2-40B4-BE49-F238E27FC236}">
+                <a16:creationId xmlns:a16="http://schemas.microsoft.com/office/drawing/2014/main" id="{A987F844-0FA7-4E4B-8712-407E62F36C45}"/>
+              </a:ext>
+            </a:extLst>
+          </p:cNvPr>
+          <p:cNvSpPr/>
+          <p:nvPr/>
+        </p:nvSpPr>
+        <p:spPr>
+          <a:xfrm>
+            <a:off x="3116155" y="838986"/>
+            <a:ext cx="53034" cy="45719"/>
+          </a:xfrm>
+          <a:prstGeom prst="triangle">
+            <a:avLst/>
+          </a:prstGeom>
+          <a:solidFill>
+            <a:srgbClr val="6EFA63"/>
+          </a:solidFill>
+          <a:ln>
+            <a:noFill/>
+          </a:ln>
+        </p:spPr>
+        <p:style>
+          <a:lnRef idx="2">
+            <a:schemeClr val="accent1">
+              <a:shade val="50000"/>
+            </a:schemeClr>
+          </a:lnRef>
+          <a:fillRef idx="1">
+            <a:schemeClr val="accent1"/>
+          </a:fillRef>
+          <a:effectRef idx="0">
+            <a:schemeClr val="accent1"/>
+          </a:effectRef>
+          <a:fontRef idx="minor">
+            <a:schemeClr val="lt1"/>
+          </a:fontRef>
+        </p:style>
+        <p:txBody>
+          <a:bodyPr rtlCol="0" anchor="ctr"/>
+          <a:lstStyle/>
+          <a:p>
+            <a:pPr algn="ctr"/>
+            <a:endParaRPr lang="en-US"/>
+          </a:p>
+        </p:txBody>
+      </p:sp>
+      <p:sp>
+        <p:nvSpPr>
+          <p:cNvPr id="60" name="TextBox 59">
+            <a:extLst>
+              <a:ext uri="{FF2B5EF4-FFF2-40B4-BE49-F238E27FC236}">
+                <a16:creationId xmlns:a16="http://schemas.microsoft.com/office/drawing/2014/main" id="{739848A1-EB8B-1B4E-B789-5247968CF8AA}"/>
+              </a:ext>
+            </a:extLst>
+          </p:cNvPr>
+          <p:cNvSpPr txBox="1"/>
+          <p:nvPr/>
+        </p:nvSpPr>
+        <p:spPr>
+          <a:xfrm>
+            <a:off x="2691320" y="7369767"/>
+            <a:ext cx="555998" cy="338554"/>
+          </a:xfrm>
+          <a:prstGeom prst="rect">
+            <a:avLst/>
+          </a:prstGeom>
+          <a:noFill/>
+        </p:spPr>
+        <p:txBody>
+          <a:bodyPr wrap="square" rtlCol="0">
+            <a:spAutoFit/>
+          </a:bodyPr>
+          <a:lstStyle/>
+          <a:p>
+            <a:r>
+              <a:rPr lang="en-US" sz="1600" i="1" dirty="0" err="1">
+                <a:latin typeface="Times" pitchFamily="2" charset="0"/>
+              </a:rPr>
+              <a:t>Δg</a:t>
+            </a:r>
+            <a:r>
+              <a:rPr lang="en-US" sz="1600" i="1" baseline="-25000" dirty="0" err="1">
+                <a:latin typeface="Times" pitchFamily="2" charset="0"/>
+              </a:rPr>
+              <a:t>c</a:t>
+            </a:r>
+            <a:endParaRPr lang="en-US" sz="1600" i="1" dirty="0"/>
+          </a:p>
+        </p:txBody>
+      </p:sp>
+      <p:sp>
+        <p:nvSpPr>
+          <p:cNvPr id="61" name="Triangle 60">
+            <a:extLst>
+              <a:ext uri="{FF2B5EF4-FFF2-40B4-BE49-F238E27FC236}">
+                <a16:creationId xmlns:a16="http://schemas.microsoft.com/office/drawing/2014/main" id="{0F217315-5069-8D44-AB92-89BBA4C35F60}"/>
+              </a:ext>
+            </a:extLst>
+          </p:cNvPr>
+          <p:cNvSpPr/>
+          <p:nvPr/>
+        </p:nvSpPr>
+        <p:spPr>
+          <a:xfrm>
+            <a:off x="3154964" y="7564402"/>
+            <a:ext cx="53034" cy="45719"/>
+          </a:xfrm>
+          <a:prstGeom prst="triangle">
+            <a:avLst/>
+          </a:prstGeom>
+          <a:solidFill>
+            <a:srgbClr val="6EFA63"/>
+          </a:solidFill>
+          <a:ln>
+            <a:noFill/>
+          </a:ln>
+        </p:spPr>
+        <p:style>
+          <a:lnRef idx="2">
+            <a:schemeClr val="accent1">
+              <a:shade val="50000"/>
+            </a:schemeClr>
+          </a:lnRef>
+          <a:fillRef idx="1">
+            <a:schemeClr val="accent1"/>
+          </a:fillRef>
+          <a:effectRef idx="0">
+            <a:schemeClr val="accent1"/>
+          </a:effectRef>
+          <a:fontRef idx="minor">
+            <a:schemeClr val="lt1"/>
+          </a:fontRef>
+        </p:style>
+        <p:txBody>
+          <a:bodyPr rtlCol="0" anchor="ctr"/>
+          <a:lstStyle/>
+          <a:p>
+            <a:pPr algn="ctr"/>
+            <a:endParaRPr lang="en-US"/>
+          </a:p>
+        </p:txBody>
+      </p:sp>
+      <p:sp>
+        <p:nvSpPr>
+          <p:cNvPr id="62" name="TextBox 61">
+            <a:extLst>
+              <a:ext uri="{FF2B5EF4-FFF2-40B4-BE49-F238E27FC236}">
+                <a16:creationId xmlns:a16="http://schemas.microsoft.com/office/drawing/2014/main" id="{BB0F9404-759D-064D-AF0C-AABAD1431ECC}"/>
+              </a:ext>
+            </a:extLst>
+          </p:cNvPr>
+          <p:cNvSpPr txBox="1"/>
+          <p:nvPr/>
+        </p:nvSpPr>
+        <p:spPr>
+          <a:xfrm>
+            <a:off x="2835124" y="9201526"/>
+            <a:ext cx="555998" cy="338554"/>
+          </a:xfrm>
+          <a:prstGeom prst="rect">
+            <a:avLst/>
+          </a:prstGeom>
+          <a:noFill/>
+        </p:spPr>
+        <p:txBody>
+          <a:bodyPr wrap="square" rtlCol="0">
+            <a:spAutoFit/>
+          </a:bodyPr>
+          <a:lstStyle/>
+          <a:p>
+            <a:r>
+              <a:rPr lang="en-US" sz="1600" i="1" dirty="0" err="1">
+                <a:latin typeface="Times" pitchFamily="2" charset="0"/>
+              </a:rPr>
+              <a:t>Δg</a:t>
+            </a:r>
+            <a:r>
+              <a:rPr lang="en-US" sz="1600" i="1" baseline="-25000" dirty="0" err="1">
+                <a:latin typeface="Times" pitchFamily="2" charset="0"/>
+              </a:rPr>
+              <a:t>c</a:t>
+            </a:r>
+            <a:endParaRPr lang="en-US" sz="1600" i="1" dirty="0"/>
+          </a:p>
+        </p:txBody>
+      </p:sp>
+      <p:sp>
+        <p:nvSpPr>
+          <p:cNvPr id="63" name="Triangle 62">
+            <a:extLst>
+              <a:ext uri="{FF2B5EF4-FFF2-40B4-BE49-F238E27FC236}">
+                <a16:creationId xmlns:a16="http://schemas.microsoft.com/office/drawing/2014/main" id="{1966711A-5A1E-5145-B003-552E145D313D}"/>
+              </a:ext>
+            </a:extLst>
+          </p:cNvPr>
+          <p:cNvSpPr/>
+          <p:nvPr/>
+        </p:nvSpPr>
+        <p:spPr>
+          <a:xfrm>
+            <a:off x="3245384" y="9443843"/>
+            <a:ext cx="53034" cy="45719"/>
+          </a:xfrm>
+          <a:prstGeom prst="triangle">
+            <a:avLst/>
+          </a:prstGeom>
+          <a:solidFill>
+            <a:srgbClr val="6EFA63"/>
+          </a:solidFill>
+          <a:ln>
+            <a:noFill/>
+          </a:ln>
+        </p:spPr>
+        <p:style>
+          <a:lnRef idx="2">
+            <a:schemeClr val="accent1">
+              <a:shade val="50000"/>
+            </a:schemeClr>
+          </a:lnRef>
+          <a:fillRef idx="1">
+            <a:schemeClr val="accent1"/>
+          </a:fillRef>
+          <a:effectRef idx="0">
+            <a:schemeClr val="accent1"/>
+          </a:effectRef>
+          <a:fontRef idx="minor">
+            <a:schemeClr val="lt1"/>
+          </a:fontRef>
+        </p:style>
+        <p:txBody>
+          <a:bodyPr rtlCol="0" anchor="ctr"/>
+          <a:lstStyle/>
+          <a:p>
+            <a:pPr algn="ctr"/>
+            <a:endParaRPr lang="en-US"/>
+          </a:p>
+        </p:txBody>
+      </p:sp>
+      <p:sp>
+        <p:nvSpPr>
+          <p:cNvPr id="64" name="TextBox 63">
+            <a:extLst>
+              <a:ext uri="{FF2B5EF4-FFF2-40B4-BE49-F238E27FC236}">
+                <a16:creationId xmlns:a16="http://schemas.microsoft.com/office/drawing/2014/main" id="{235C1D58-EEF7-CF46-93D2-26E43C397483}"/>
+              </a:ext>
+            </a:extLst>
+          </p:cNvPr>
+          <p:cNvSpPr txBox="1"/>
+          <p:nvPr/>
+        </p:nvSpPr>
+        <p:spPr>
+          <a:xfrm>
+            <a:off x="3144546" y="11829153"/>
+            <a:ext cx="555998" cy="338554"/>
+          </a:xfrm>
+          <a:prstGeom prst="rect">
+            <a:avLst/>
+          </a:prstGeom>
+          <a:noFill/>
+        </p:spPr>
+        <p:txBody>
+          <a:bodyPr wrap="square" rtlCol="0">
+            <a:spAutoFit/>
+          </a:bodyPr>
+          <a:lstStyle/>
+          <a:p>
+            <a:r>
+              <a:rPr lang="en-US" sz="1600" i="1" dirty="0" err="1">
+                <a:latin typeface="Times" pitchFamily="2" charset="0"/>
+              </a:rPr>
+              <a:t>Δg</a:t>
+            </a:r>
+            <a:r>
+              <a:rPr lang="en-US" sz="1600" i="1" baseline="-25000" dirty="0" err="1">
+                <a:latin typeface="Times" pitchFamily="2" charset="0"/>
+              </a:rPr>
+              <a:t>c</a:t>
+            </a:r>
+            <a:endParaRPr lang="en-US" sz="1600" i="1" dirty="0"/>
+          </a:p>
+        </p:txBody>
+      </p:sp>
+      <p:sp>
+        <p:nvSpPr>
+          <p:cNvPr id="65" name="Triangle 64">
+            <a:extLst>
+              <a:ext uri="{FF2B5EF4-FFF2-40B4-BE49-F238E27FC236}">
+                <a16:creationId xmlns:a16="http://schemas.microsoft.com/office/drawing/2014/main" id="{6A6F86FB-0F7E-1542-A3BD-0691EF095462}"/>
+              </a:ext>
+            </a:extLst>
+          </p:cNvPr>
+          <p:cNvSpPr/>
+          <p:nvPr/>
+        </p:nvSpPr>
+        <p:spPr>
+          <a:xfrm>
+            <a:off x="3249222" y="11901081"/>
+            <a:ext cx="53034" cy="45719"/>
+          </a:xfrm>
+          <a:prstGeom prst="triangle">
+            <a:avLst/>
+          </a:prstGeom>
+          <a:solidFill>
+            <a:srgbClr val="6EFA63"/>
+          </a:solidFill>
+          <a:ln>
+            <a:noFill/>
+          </a:ln>
+        </p:spPr>
+        <p:style>
+          <a:lnRef idx="2">
+            <a:schemeClr val="accent1">
+              <a:shade val="50000"/>
+            </a:schemeClr>
+          </a:lnRef>
+          <a:fillRef idx="1">
+            <a:schemeClr val="accent1"/>
+          </a:fillRef>
+          <a:effectRef idx="0">
+            <a:schemeClr val="accent1"/>
+          </a:effectRef>
+          <a:fontRef idx="minor">
+            <a:schemeClr val="lt1"/>
+          </a:fontRef>
+        </p:style>
+        <p:txBody>
+          <a:bodyPr rtlCol="0" anchor="ctr"/>
+          <a:lstStyle/>
+          <a:p>
+            <a:pPr algn="ctr"/>
+            <a:endParaRPr lang="en-US"/>
           </a:p>
         </p:txBody>
       </p:sp>

</xml_diff>